<commit_message>
ECS and MAD project added. some files added too
</commit_message>
<xml_diff>
--- a/physics/Lectures and Tutorials/Chapter4-Dynamics/MS864M_Chapter 4 - Dynamics_new design.pptx
+++ b/physics/Lectures and Tutorials/Chapter4-Dynamics/MS864M_Chapter 4 - Dynamics_new design.pptx
@@ -244,7 +244,7 @@
           <a:p>
             <a:fld id="{3054530E-66E8-4EEF-8660-8A53FF529BDE}" type="datetimeFigureOut">
               <a:rPr lang="en-SG" smtClean="0"/>
-              <a:t>5/10/2018</a:t>
+              <a:t>25/11/2018</a:t>
             </a:fld>
             <a:endParaRPr lang="en-SG"/>
           </a:p>
@@ -308,35 +308,35 @@
           <a:p>
             <a:pPr lvl="0"/>
             <a:r>
-              <a:rPr lang="en-US" smtClean="0"/>
+              <a:rPr lang="en-US"/>
               <a:t>Edit Master text styles</a:t>
             </a:r>
           </a:p>
           <a:p>
             <a:pPr lvl="1"/>
             <a:r>
-              <a:rPr lang="en-US" smtClean="0"/>
+              <a:rPr lang="en-US"/>
               <a:t>Second level</a:t>
             </a:r>
           </a:p>
           <a:p>
             <a:pPr lvl="2"/>
             <a:r>
-              <a:rPr lang="en-US" smtClean="0"/>
+              <a:rPr lang="en-US"/>
               <a:t>Third level</a:t>
             </a:r>
           </a:p>
           <a:p>
             <a:pPr lvl="3"/>
             <a:r>
-              <a:rPr lang="en-US" smtClean="0"/>
+              <a:rPr lang="en-US"/>
               <a:t>Fourth level</a:t>
             </a:r>
           </a:p>
           <a:p>
             <a:pPr lvl="4"/>
             <a:r>
-              <a:rPr lang="en-US" smtClean="0"/>
+              <a:rPr lang="en-US"/>
               <a:t>Fifth level</a:t>
             </a:r>
             <a:endParaRPr lang="en-SG"/>
@@ -574,14 +574,14 @@
               <a:defRPr/>
             </a:pPr>
             <a:r>
-              <a:rPr lang="en-GB" dirty="0" smtClean="0"/>
+              <a:rPr lang="en-GB" dirty="0"/>
               <a:t>F = -1.8N. The negative sign indicates that the direction of the force is opposite</a:t>
             </a:r>
             <a:r>
-              <a:rPr lang="en-GB" baseline="0" dirty="0" smtClean="0"/>
+              <a:rPr lang="en-GB" baseline="0" dirty="0"/>
               <a:t> to the motion. </a:t>
             </a:r>
-            <a:endParaRPr lang="en-US" dirty="0" smtClean="0"/>
+            <a:endParaRPr lang="en-US" dirty="0"/>
           </a:p>
         </p:txBody>
       </p:sp>
@@ -683,74 +683,74 @@
               <a:defRPr/>
             </a:pPr>
             <a:r>
-              <a:rPr lang="en-GB" dirty="0" smtClean="0"/>
+              <a:rPr lang="en-GB" dirty="0"/>
               <a:t>Top: </a:t>
             </a:r>
             <a:r>
-              <a:rPr lang="en-GB" dirty="0" err="1" smtClean="0"/>
+              <a:rPr lang="en-GB" dirty="0" err="1"/>
               <a:t>N</a:t>
             </a:r>
             <a:r>
-              <a:rPr lang="en-GB" baseline="-25000" dirty="0" err="1" smtClean="0"/>
+              <a:rPr lang="en-GB" baseline="-25000" dirty="0" err="1"/>
               <a:t>top</a:t>
             </a:r>
             <a:r>
-              <a:rPr lang="en-GB" baseline="-25000" dirty="0" smtClean="0"/>
+              <a:rPr lang="en-GB" baseline="-25000" dirty="0"/>
               <a:t> </a:t>
             </a:r>
             <a:r>
-              <a:rPr lang="en-GB" baseline="0" dirty="0" smtClean="0"/>
+              <a:rPr lang="en-GB" baseline="0" dirty="0"/>
               <a:t>=  mg (1 – v</a:t>
             </a:r>
             <a:r>
-              <a:rPr lang="en-GB" baseline="30000" dirty="0" smtClean="0"/>
+              <a:rPr lang="en-GB" baseline="30000" dirty="0"/>
               <a:t>2</a:t>
             </a:r>
             <a:r>
-              <a:rPr lang="en-GB" baseline="0" dirty="0" smtClean="0"/>
+              <a:rPr lang="en-GB" baseline="0" dirty="0"/>
               <a:t>/</a:t>
             </a:r>
             <a:r>
-              <a:rPr lang="en-GB" baseline="0" dirty="0" err="1" smtClean="0"/>
+              <a:rPr lang="en-GB" baseline="0" dirty="0" err="1"/>
               <a:t>gR</a:t>
             </a:r>
             <a:r>
-              <a:rPr lang="en-GB" baseline="0" dirty="0" smtClean="0"/>
+              <a:rPr lang="en-GB" baseline="0" dirty="0"/>
               <a:t>), </a:t>
             </a:r>
             <a:r>
-              <a:rPr lang="en-GB" dirty="0" smtClean="0"/>
+              <a:rPr lang="en-GB" dirty="0"/>
               <a:t>Bottom: </a:t>
             </a:r>
             <a:r>
-              <a:rPr lang="en-GB" dirty="0" err="1" smtClean="0"/>
+              <a:rPr lang="en-GB" dirty="0" err="1"/>
               <a:t>N</a:t>
             </a:r>
             <a:r>
-              <a:rPr lang="en-GB" baseline="-25000" dirty="0" err="1" smtClean="0"/>
+              <a:rPr lang="en-GB" baseline="-25000" dirty="0" err="1"/>
               <a:t>bottom</a:t>
             </a:r>
             <a:r>
-              <a:rPr lang="en-GB" baseline="0" dirty="0" smtClean="0"/>
+              <a:rPr lang="en-GB" baseline="0" dirty="0"/>
               <a:t>=  mg (1 + v</a:t>
             </a:r>
             <a:r>
-              <a:rPr lang="en-GB" baseline="30000" dirty="0" smtClean="0"/>
+              <a:rPr lang="en-GB" baseline="30000" dirty="0"/>
               <a:t>2</a:t>
             </a:r>
             <a:r>
-              <a:rPr lang="en-GB" baseline="0" dirty="0" smtClean="0"/>
+              <a:rPr lang="en-GB" baseline="0" dirty="0"/>
               <a:t>/</a:t>
             </a:r>
             <a:r>
-              <a:rPr lang="en-GB" baseline="0" dirty="0" err="1" smtClean="0"/>
+              <a:rPr lang="en-GB" baseline="0" dirty="0" err="1"/>
               <a:t>gR</a:t>
             </a:r>
             <a:r>
-              <a:rPr lang="en-GB" baseline="0" dirty="0" smtClean="0"/>
+              <a:rPr lang="en-GB" baseline="0" dirty="0"/>
               <a:t>)</a:t>
             </a:r>
-            <a:endParaRPr lang="en-US" baseline="30000" dirty="0" smtClean="0"/>
+            <a:endParaRPr lang="en-US" baseline="30000" dirty="0"/>
           </a:p>
           <a:p>
             <a:endParaRPr lang="en-SG" dirty="0"/>
@@ -838,48 +838,48 @@
           <a:lstStyle/>
           <a:p>
             <a:r>
-              <a:rPr lang="en-GB" dirty="0" smtClean="0"/>
+              <a:rPr lang="en-GB" dirty="0"/>
               <a:t>(a) (</a:t>
             </a:r>
             <a:r>
-              <a:rPr lang="en-GB" dirty="0" err="1" smtClean="0"/>
+              <a:rPr lang="en-GB" dirty="0" err="1"/>
               <a:t>i</a:t>
             </a:r>
             <a:r>
-              <a:rPr lang="en-GB" dirty="0" smtClean="0"/>
+              <a:rPr lang="en-GB" dirty="0"/>
               <a:t>)</a:t>
             </a:r>
             <a:r>
-              <a:rPr lang="en-GB" baseline="0" dirty="0" smtClean="0"/>
+              <a:rPr lang="en-GB" baseline="0" dirty="0"/>
               <a:t> </a:t>
             </a:r>
             <a:r>
-              <a:rPr lang="en-GB" dirty="0" smtClean="0"/>
+              <a:rPr lang="en-GB" dirty="0"/>
               <a:t>W</a:t>
             </a:r>
             <a:r>
-              <a:rPr lang="en-GB" baseline="-25000" dirty="0" smtClean="0"/>
+              <a:rPr lang="en-GB" baseline="-25000" dirty="0"/>
               <a:t>G</a:t>
             </a:r>
             <a:r>
-              <a:rPr lang="en-GB" baseline="0" dirty="0" smtClean="0"/>
+              <a:rPr lang="en-GB" baseline="0" dirty="0"/>
               <a:t> = 490 N (ii) T</a:t>
             </a:r>
             <a:r>
-              <a:rPr lang="en-GB" baseline="-25000" dirty="0" smtClean="0"/>
+              <a:rPr lang="en-GB" baseline="-25000" dirty="0"/>
               <a:t>R on G</a:t>
             </a:r>
             <a:r>
-              <a:rPr lang="en-GB" baseline="0" dirty="0" smtClean="0"/>
+              <a:rPr lang="en-GB" baseline="0" dirty="0"/>
               <a:t>  = 490 N  (iii) T = 490 N</a:t>
             </a:r>
           </a:p>
           <a:p>
             <a:r>
-              <a:rPr lang="en-GB" baseline="0" dirty="0" smtClean="0"/>
+              <a:rPr lang="en-GB" baseline="0" dirty="0"/>
               <a:t>(b) T = 610 N</a:t>
             </a:r>
-            <a:endParaRPr lang="en-US" baseline="-25000" dirty="0" smtClean="0"/>
+            <a:endParaRPr lang="en-US" baseline="-25000" dirty="0"/>
           </a:p>
         </p:txBody>
       </p:sp>
@@ -981,42 +981,42 @@
               <a:defRPr/>
             </a:pPr>
             <a:r>
-              <a:rPr lang="en-GB" dirty="0" smtClean="0"/>
+              <a:rPr lang="en-GB" dirty="0"/>
               <a:t>T</a:t>
             </a:r>
             <a:r>
-              <a:rPr lang="en-GB" baseline="-25000" dirty="0" smtClean="0"/>
+              <a:rPr lang="en-GB" baseline="-25000" dirty="0"/>
               <a:t>1</a:t>
             </a:r>
             <a:r>
-              <a:rPr lang="en-GB" baseline="0" dirty="0" smtClean="0"/>
+              <a:rPr lang="en-GB" baseline="0" dirty="0"/>
               <a:t> = w, </a:t>
             </a:r>
             <a:r>
-              <a:rPr lang="en-GB" dirty="0" smtClean="0"/>
+              <a:rPr lang="en-GB" dirty="0"/>
               <a:t>T</a:t>
             </a:r>
             <a:r>
-              <a:rPr lang="en-GB" baseline="-25000" dirty="0" smtClean="0"/>
+              <a:rPr lang="en-GB" baseline="-25000" dirty="0"/>
               <a:t>2</a:t>
             </a:r>
             <a:r>
-              <a:rPr lang="en-GB" baseline="0" dirty="0" smtClean="0"/>
+              <a:rPr lang="en-GB" baseline="0" dirty="0"/>
               <a:t> = 0.58 w,</a:t>
             </a:r>
             <a:r>
-              <a:rPr lang="en-GB" dirty="0" smtClean="0"/>
+              <a:rPr lang="en-GB" dirty="0"/>
               <a:t> T</a:t>
             </a:r>
             <a:r>
-              <a:rPr lang="en-GB" baseline="-25000" dirty="0" smtClean="0"/>
+              <a:rPr lang="en-GB" baseline="-25000" dirty="0"/>
               <a:t>3</a:t>
             </a:r>
             <a:r>
-              <a:rPr lang="en-GB" baseline="0" dirty="0" smtClean="0"/>
+              <a:rPr lang="en-GB" baseline="0" dirty="0"/>
               <a:t> = 1.2 w</a:t>
             </a:r>
-            <a:endParaRPr lang="en-US" baseline="-25000" dirty="0" smtClean="0"/>
+            <a:endParaRPr lang="en-US" baseline="-25000" dirty="0"/>
           </a:p>
           <a:p>
             <a:endParaRPr lang="en-SG" dirty="0"/>
@@ -1121,31 +1121,31 @@
               <a:defRPr/>
             </a:pPr>
             <a:r>
-              <a:rPr lang="en-GB" baseline="0" dirty="0" smtClean="0"/>
+              <a:rPr lang="en-GB" baseline="0" dirty="0"/>
               <a:t>Acceleration of the glider and the object is </a:t>
             </a:r>
             <a:r>
-              <a:rPr lang="en-US" sz="1200" dirty="0" smtClean="0"/>
+              <a:rPr lang="en-US" sz="1200" dirty="0"/>
               <a:t>m</a:t>
             </a:r>
             <a:r>
-              <a:rPr lang="en-US" sz="1200" baseline="-25000" dirty="0" smtClean="0"/>
+              <a:rPr lang="en-US" sz="1200" baseline="-25000" dirty="0"/>
               <a:t>2</a:t>
             </a:r>
             <a:r>
-              <a:rPr lang="en-GB" sz="1200" dirty="0" smtClean="0"/>
+              <a:rPr lang="en-GB" sz="1200" dirty="0"/>
               <a:t>g/(</a:t>
             </a:r>
             <a:r>
-              <a:rPr lang="en-US" sz="1200" dirty="0" smtClean="0"/>
+              <a:rPr lang="en-US" sz="1200" dirty="0"/>
               <a:t>m</a:t>
             </a:r>
             <a:r>
-              <a:rPr lang="en-US" sz="1200" baseline="-25000" dirty="0" smtClean="0"/>
+              <a:rPr lang="en-US" sz="1200" baseline="-25000" dirty="0"/>
               <a:t>1</a:t>
             </a:r>
             <a:r>
-              <a:rPr lang="en-US" sz="1200" kern="1200" baseline="0" dirty="0" smtClean="0">
+              <a:rPr lang="en-US" sz="1200" kern="1200" baseline="0" dirty="0">
                 <a:solidFill>
                   <a:schemeClr val="tx1"/>
                 </a:solidFill>
@@ -1156,15 +1156,15 @@
               <a:t>+</a:t>
             </a:r>
             <a:r>
-              <a:rPr lang="en-US" sz="1200" dirty="0" smtClean="0"/>
+              <a:rPr lang="en-US" sz="1200" dirty="0"/>
               <a:t>m</a:t>
             </a:r>
             <a:r>
-              <a:rPr lang="en-US" sz="1200" baseline="-25000" dirty="0" smtClean="0"/>
+              <a:rPr lang="en-US" sz="1200" baseline="-25000" dirty="0"/>
               <a:t>2</a:t>
             </a:r>
             <a:r>
-              <a:rPr kumimoji="0" lang="en-GB" sz="2000" kern="1200" spc="0" baseline="0" dirty="0" smtClean="0">
+              <a:rPr kumimoji="0" lang="en-GB" sz="2000" kern="1200" spc="0" baseline="0" dirty="0">
                 <a:solidFill>
                   <a:schemeClr val="tx1"/>
                 </a:solidFill>
@@ -1175,35 +1175,35 @@
               <a:t>)  and Tension is (</a:t>
             </a:r>
             <a:r>
-              <a:rPr lang="en-US" sz="1200" dirty="0" smtClean="0"/>
+              <a:rPr lang="en-US" sz="1200" dirty="0"/>
               <a:t>m</a:t>
             </a:r>
             <a:r>
-              <a:rPr lang="en-US" sz="1200" baseline="-25000" dirty="0" smtClean="0"/>
+              <a:rPr lang="en-US" sz="1200" baseline="-25000" dirty="0"/>
               <a:t>1</a:t>
             </a:r>
             <a:r>
-              <a:rPr lang="en-US" sz="1200" dirty="0" smtClean="0"/>
+              <a:rPr lang="en-US" sz="1200" dirty="0"/>
               <a:t>m</a:t>
             </a:r>
             <a:r>
-              <a:rPr lang="en-US" sz="1200" baseline="-25000" dirty="0" smtClean="0"/>
+              <a:rPr lang="en-US" sz="1200" baseline="-25000" dirty="0"/>
               <a:t>2</a:t>
             </a:r>
             <a:r>
-              <a:rPr lang="en-GB" sz="1200" dirty="0" smtClean="0"/>
+              <a:rPr lang="en-GB" sz="1200" dirty="0"/>
               <a:t>g)/(</a:t>
             </a:r>
             <a:r>
-              <a:rPr lang="en-US" sz="1200" dirty="0" smtClean="0"/>
+              <a:rPr lang="en-US" sz="1200" dirty="0"/>
               <a:t>m</a:t>
             </a:r>
             <a:r>
-              <a:rPr lang="en-US" sz="1200" baseline="-25000" dirty="0" smtClean="0"/>
+              <a:rPr lang="en-US" sz="1200" baseline="-25000" dirty="0"/>
               <a:t>1</a:t>
             </a:r>
             <a:r>
-              <a:rPr lang="en-US" sz="1200" kern="1200" baseline="0" dirty="0" smtClean="0">
+              <a:rPr lang="en-US" sz="1200" kern="1200" baseline="0" dirty="0">
                 <a:solidFill>
                   <a:schemeClr val="tx1"/>
                 </a:solidFill>
@@ -1214,15 +1214,15 @@
               <a:t>+</a:t>
             </a:r>
             <a:r>
-              <a:rPr lang="en-US" sz="1200" dirty="0" smtClean="0"/>
+              <a:rPr lang="en-US" sz="1200" dirty="0"/>
               <a:t>m</a:t>
             </a:r>
             <a:r>
-              <a:rPr lang="en-US" sz="1200" baseline="-25000" dirty="0" smtClean="0"/>
+              <a:rPr lang="en-US" sz="1200" baseline="-25000" dirty="0"/>
               <a:t>2</a:t>
             </a:r>
             <a:r>
-              <a:rPr kumimoji="0" lang="en-GB" sz="2000" kern="1200" spc="0" baseline="0" dirty="0" smtClean="0">
+              <a:rPr kumimoji="0" lang="en-GB" sz="2000" kern="1200" spc="0" baseline="0" dirty="0">
                 <a:solidFill>
                   <a:schemeClr val="tx1"/>
                 </a:solidFill>
@@ -1232,7 +1232,7 @@
               </a:rPr>
               <a:t>).</a:t>
             </a:r>
-            <a:endParaRPr kumimoji="0" lang="en-US" sz="2000" kern="1200" spc="0" baseline="30000" dirty="0" smtClean="0">
+            <a:endParaRPr kumimoji="0" lang="en-US" sz="2000" kern="1200" spc="0" baseline="30000" dirty="0">
               <a:solidFill>
                 <a:schemeClr val="tx1"/>
               </a:solidFill>
@@ -1341,46 +1341,46 @@
               <a:defRPr/>
             </a:pPr>
             <a:r>
-              <a:rPr lang="en-GB" baseline="0" dirty="0" smtClean="0"/>
+              <a:rPr lang="en-GB" baseline="0" dirty="0"/>
               <a:t>w</a:t>
             </a:r>
             <a:r>
-              <a:rPr lang="en-GB" baseline="-25000" dirty="0" smtClean="0"/>
+              <a:rPr lang="en-GB" baseline="-25000" dirty="0"/>
               <a:t>2</a:t>
             </a:r>
             <a:r>
-              <a:rPr lang="en-GB" dirty="0" smtClean="0"/>
+              <a:rPr lang="en-GB" dirty="0"/>
               <a:t> </a:t>
             </a:r>
             <a:r>
-              <a:rPr lang="en-GB" baseline="0" dirty="0" smtClean="0"/>
+              <a:rPr lang="en-GB" baseline="0" dirty="0"/>
               <a:t>= w</a:t>
             </a:r>
             <a:r>
-              <a:rPr lang="en-GB" baseline="-25000" dirty="0" smtClean="0"/>
+              <a:rPr lang="en-GB" baseline="-25000" dirty="0"/>
               <a:t>1</a:t>
             </a:r>
             <a:r>
-              <a:rPr lang="en-GB" baseline="0" dirty="0" smtClean="0"/>
+              <a:rPr lang="en-GB" baseline="0" dirty="0"/>
               <a:t> sin</a:t>
             </a:r>
             <a:r>
-              <a:rPr lang="en-US" sz="1200" dirty="0" smtClean="0"/>
+              <a:rPr lang="en-US" sz="1200" dirty="0"/>
               <a:t>15</a:t>
             </a:r>
             <a:r>
-              <a:rPr lang="en-US" sz="1200" baseline="30000" dirty="0" smtClean="0"/>
+              <a:rPr lang="en-US" sz="1200" baseline="30000" dirty="0"/>
               <a:t>o</a:t>
             </a:r>
             <a:r>
-              <a:rPr lang="en-GB" baseline="0" dirty="0" smtClean="0"/>
+              <a:rPr lang="en-GB" baseline="0" dirty="0"/>
               <a:t> = 0.26 w</a:t>
             </a:r>
             <a:r>
-              <a:rPr lang="en-GB" baseline="-25000" dirty="0" smtClean="0"/>
+              <a:rPr lang="en-GB" baseline="-25000" dirty="0"/>
               <a:t>1</a:t>
             </a:r>
-            <a:endParaRPr lang="en-US" baseline="-25000" dirty="0" smtClean="0"/>
+            <a:endParaRPr lang="en-US" baseline="-25000" dirty="0"/>
           </a:p>
           <a:p>
             <a:endParaRPr lang="en-SG" dirty="0"/>
@@ -1468,20 +1468,20 @@
           <a:lstStyle/>
           <a:p>
             <a:r>
-              <a:rPr lang="en-GB" dirty="0" smtClean="0"/>
+              <a:rPr lang="en-GB" dirty="0"/>
               <a:t>(a) </a:t>
             </a:r>
             <a:r>
-              <a:rPr lang="en-GB" baseline="0" dirty="0" smtClean="0"/>
+              <a:rPr lang="en-GB" baseline="0" dirty="0"/>
               <a:t>Tension  = 9440 N  </a:t>
             </a:r>
           </a:p>
           <a:p>
             <a:r>
-              <a:rPr lang="en-GB" baseline="0" dirty="0" smtClean="0"/>
+              <a:rPr lang="en-GB" baseline="0" dirty="0"/>
               <a:t>(b) Reading on the scale = 590 N</a:t>
             </a:r>
-            <a:endParaRPr lang="en-US" baseline="-25000" dirty="0" smtClean="0"/>
+            <a:endParaRPr lang="en-US" baseline="-25000" dirty="0"/>
           </a:p>
           <a:p>
             <a:endParaRPr lang="en-SG" dirty="0"/>
@@ -1586,35 +1586,35 @@
               <a:defRPr/>
             </a:pPr>
             <a:r>
-              <a:rPr lang="en-GB" dirty="0" smtClean="0"/>
+              <a:rPr lang="en-GB" dirty="0"/>
               <a:t>(</a:t>
             </a:r>
             <a:r>
-              <a:rPr lang="en-GB" dirty="0" err="1" smtClean="0"/>
+              <a:rPr lang="en-GB" dirty="0" err="1"/>
               <a:t>i</a:t>
             </a:r>
             <a:r>
-              <a:rPr lang="en-GB" dirty="0" smtClean="0"/>
+              <a:rPr lang="en-GB" dirty="0"/>
               <a:t>)</a:t>
             </a:r>
             <a:r>
-              <a:rPr lang="en-GB" baseline="0" dirty="0" smtClean="0"/>
+              <a:rPr lang="en-GB" baseline="0" dirty="0"/>
               <a:t> a = </a:t>
             </a:r>
             <a:r>
-              <a:rPr lang="en-GB" sz="900" baseline="-25000" dirty="0" smtClean="0"/>
+              <a:rPr lang="en-GB" sz="900" baseline="-25000" dirty="0"/>
               <a:t> </a:t>
             </a:r>
             <a:r>
-              <a:rPr lang="en-GB" sz="900" dirty="0" smtClean="0"/>
+              <a:rPr lang="en-GB" sz="900" dirty="0"/>
               <a:t>g </a:t>
             </a:r>
             <a:r>
-              <a:rPr lang="en-GB" baseline="0" dirty="0" smtClean="0"/>
+              <a:rPr lang="en-GB" baseline="0" dirty="0"/>
               <a:t>sin </a:t>
             </a:r>
             <a:r>
-              <a:rPr kumimoji="0" lang="el-GR" sz="900" kern="1200" spc="0" baseline="0" dirty="0" smtClean="0">
+              <a:rPr kumimoji="0" lang="el-GR" sz="900" kern="1200" spc="0" baseline="0" dirty="0">
                 <a:solidFill>
                   <a:schemeClr val="tx1"/>
                 </a:solidFill>
@@ -1625,7 +1625,7 @@
               <a:t>α</a:t>
             </a:r>
             <a:r>
-              <a:rPr kumimoji="0" lang="en-GB" sz="1200" kern="1200" spc="0" baseline="0" dirty="0" smtClean="0">
+              <a:rPr kumimoji="0" lang="en-GB" sz="1200" kern="1200" spc="0" baseline="0" dirty="0">
                 <a:solidFill>
                   <a:schemeClr val="tx1"/>
                 </a:solidFill>
@@ -1636,43 +1636,43 @@
               <a:t>, (ii) </a:t>
             </a:r>
             <a:r>
-              <a:rPr lang="el-GR" sz="900" dirty="0" smtClean="0"/>
+              <a:rPr lang="el-GR" sz="900" dirty="0"/>
               <a:t>α</a:t>
             </a:r>
             <a:r>
-              <a:rPr lang="en-GB" sz="1200" dirty="0" smtClean="0"/>
+              <a:rPr lang="en-GB" sz="1200" dirty="0"/>
               <a:t> = tan</a:t>
             </a:r>
             <a:r>
-              <a:rPr lang="en-GB" sz="1200" baseline="30000" dirty="0" smtClean="0"/>
+              <a:rPr lang="en-GB" sz="1200" baseline="30000" dirty="0"/>
               <a:t>-1</a:t>
             </a:r>
             <a:r>
-              <a:rPr lang="en-GB" sz="1200" baseline="0" dirty="0" smtClean="0"/>
+              <a:rPr lang="en-GB" sz="1200" baseline="0" dirty="0"/>
               <a:t>(</a:t>
             </a:r>
             <a:r>
-              <a:rPr lang="en-GB" sz="1200" dirty="0" smtClean="0"/>
+              <a:rPr lang="en-GB" sz="1200" dirty="0"/>
               <a:t>µ</a:t>
             </a:r>
             <a:r>
-              <a:rPr lang="en-GB" sz="1200" baseline="-25000" dirty="0" smtClean="0"/>
+              <a:rPr lang="en-GB" sz="1200" baseline="-25000" dirty="0"/>
               <a:t>k</a:t>
             </a:r>
             <a:r>
-              <a:rPr lang="en-GB" sz="1200" baseline="0" dirty="0" smtClean="0"/>
+              <a:rPr lang="en-GB" sz="1200" baseline="0" dirty="0"/>
               <a:t>), (iii) a = </a:t>
             </a:r>
             <a:r>
-              <a:rPr lang="en-GB" sz="1200" dirty="0" smtClean="0"/>
+              <a:rPr lang="en-GB" sz="1200" dirty="0"/>
               <a:t>g (</a:t>
             </a:r>
             <a:r>
-              <a:rPr lang="en-GB" sz="1200" baseline="0" dirty="0" smtClean="0"/>
+              <a:rPr lang="en-GB" sz="1200" baseline="0" dirty="0"/>
               <a:t>sin </a:t>
             </a:r>
             <a:r>
-              <a:rPr kumimoji="0" lang="el-GR" sz="2000" kern="1200" spc="0" baseline="0" dirty="0" smtClean="0">
+              <a:rPr kumimoji="0" lang="el-GR" sz="2000" kern="1200" spc="0" baseline="0" dirty="0">
                 <a:solidFill>
                   <a:schemeClr val="tx1"/>
                 </a:solidFill>
@@ -1683,7 +1683,7 @@
               <a:t>α</a:t>
             </a:r>
             <a:r>
-              <a:rPr kumimoji="0" lang="en-GB" sz="2000" kern="1200" spc="0" baseline="0" dirty="0" smtClean="0">
+              <a:rPr kumimoji="0" lang="en-GB" sz="2000" kern="1200" spc="0" baseline="0" dirty="0">
                 <a:solidFill>
                   <a:schemeClr val="tx1"/>
                 </a:solidFill>
@@ -1694,15 +1694,15 @@
               <a:t> - </a:t>
             </a:r>
             <a:r>
-              <a:rPr lang="en-GB" sz="2000" dirty="0" smtClean="0"/>
+              <a:rPr lang="en-GB" sz="2000" dirty="0"/>
               <a:t>µ</a:t>
             </a:r>
             <a:r>
-              <a:rPr lang="en-GB" sz="2000" baseline="-25000" dirty="0" smtClean="0"/>
+              <a:rPr lang="en-GB" sz="2000" baseline="-25000" dirty="0"/>
               <a:t>k</a:t>
             </a:r>
             <a:r>
-              <a:rPr kumimoji="0" lang="en-GB" sz="2000" kern="1200" spc="0" baseline="0" dirty="0" smtClean="0">
+              <a:rPr kumimoji="0" lang="en-GB" sz="2000" kern="1200" spc="0" baseline="0" dirty="0">
                 <a:solidFill>
                   <a:schemeClr val="tx1"/>
                 </a:solidFill>
@@ -1713,14 +1713,14 @@
               <a:t> cos </a:t>
             </a:r>
             <a:r>
-              <a:rPr lang="el-GR" sz="900" dirty="0" smtClean="0"/>
+              <a:rPr lang="el-GR" sz="900" dirty="0"/>
               <a:t>α</a:t>
             </a:r>
             <a:r>
-              <a:rPr lang="en-GB" sz="1200" dirty="0" smtClean="0"/>
+              <a:rPr lang="en-GB" sz="1200" dirty="0"/>
               <a:t>)</a:t>
             </a:r>
-            <a:endParaRPr kumimoji="0" lang="en-US" sz="1200" kern="1200" spc="0" baseline="30000" dirty="0" smtClean="0">
+            <a:endParaRPr kumimoji="0" lang="en-US" sz="1200" kern="1200" spc="0" baseline="30000" dirty="0">
               <a:solidFill>
                 <a:schemeClr val="tx1"/>
               </a:solidFill>
@@ -1815,19 +1815,19 @@
               <a:buAutoNum type="alphaLcParenR"/>
             </a:pPr>
             <a:r>
-              <a:rPr lang="en-GB" dirty="0" smtClean="0"/>
+              <a:rPr lang="en-GB" dirty="0"/>
               <a:t>The</a:t>
             </a:r>
             <a:r>
-              <a:rPr lang="en-GB" baseline="0" dirty="0" smtClean="0"/>
+              <a:rPr lang="en-GB" baseline="0" dirty="0"/>
               <a:t> direction of the velocity is changing due to the net force which is the centripetal force  b) v</a:t>
             </a:r>
             <a:r>
-              <a:rPr lang="en-GB" baseline="30000" dirty="0" smtClean="0"/>
+              <a:rPr lang="en-GB" baseline="30000" dirty="0"/>
               <a:t>2</a:t>
             </a:r>
             <a:r>
-              <a:rPr lang="en-GB" baseline="0" dirty="0" smtClean="0"/>
+              <a:rPr lang="en-GB" baseline="0" dirty="0"/>
               <a:t>/R</a:t>
             </a:r>
           </a:p>
@@ -1836,26 +1836,26 @@
               <a:buNone/>
             </a:pPr>
             <a:r>
-              <a:rPr lang="en-GB" baseline="0" dirty="0" smtClean="0"/>
+              <a:rPr lang="en-GB" baseline="0" dirty="0"/>
               <a:t>b)   The required force or the net force is the centripetal force if it moves at a constant force. b)Tension, gravity </a:t>
             </a:r>
             <a:r>
-              <a:rPr lang="en-GB" baseline="0" dirty="0" err="1" smtClean="0"/>
+              <a:rPr lang="en-GB" baseline="0" dirty="0" err="1"/>
               <a:t>etc</a:t>
             </a:r>
             <a:r>
-              <a:rPr lang="en-GB" baseline="0" dirty="0" smtClean="0"/>
+              <a:rPr lang="en-GB" baseline="0" dirty="0"/>
               <a:t> together may add up to centripetal force. For a non-uniform circular motion the net force is a result of the centripetal and </a:t>
             </a:r>
             <a:r>
-              <a:rPr lang="en-GB" baseline="0" dirty="0" err="1" smtClean="0"/>
+              <a:rPr lang="en-GB" baseline="0" dirty="0" err="1"/>
               <a:t>tangetial</a:t>
             </a:r>
             <a:r>
-              <a:rPr lang="en-GB" baseline="0" dirty="0" smtClean="0"/>
+              <a:rPr lang="en-GB" baseline="0" dirty="0"/>
               <a:t> forces.</a:t>
             </a:r>
-            <a:endParaRPr lang="en-US" dirty="0" smtClean="0"/>
+            <a:endParaRPr lang="en-US" dirty="0"/>
           </a:p>
           <a:p>
             <a:endParaRPr lang="en-SG" dirty="0"/>
@@ -1960,47 +1960,47 @@
               <a:defRPr/>
             </a:pPr>
             <a:r>
-              <a:rPr lang="en-GB" dirty="0" smtClean="0"/>
+              <a:rPr lang="en-GB" dirty="0"/>
               <a:t>F = mg/cos </a:t>
             </a:r>
             <a:r>
-              <a:rPr lang="el-GR" sz="1200" dirty="0" smtClean="0"/>
+              <a:rPr lang="el-GR" sz="1200" dirty="0"/>
               <a:t>β</a:t>
             </a:r>
             <a:r>
-              <a:rPr lang="en-GB" sz="1200" dirty="0" smtClean="0"/>
+              <a:rPr lang="en-GB" sz="1200" dirty="0"/>
               <a:t>, T = 2</a:t>
             </a:r>
             <a:r>
-              <a:rPr lang="el-GR" sz="1200" i="0" dirty="0" smtClean="0">
+              <a:rPr lang="el-GR" sz="1200" i="0" dirty="0">
                 <a:latin typeface="+mn-lt"/>
                 <a:cs typeface="Times New Roman" pitchFamily="18" charset="0"/>
               </a:rPr>
               <a:t>π√</a:t>
             </a:r>
             <a:r>
-              <a:rPr lang="en-GB" sz="1200" i="0" dirty="0" smtClean="0">
+              <a:rPr lang="en-GB" sz="1200" i="0" dirty="0">
                 <a:latin typeface="+mn-lt"/>
                 <a:cs typeface="Times New Roman" pitchFamily="18" charset="0"/>
               </a:rPr>
               <a:t>(L cos </a:t>
             </a:r>
             <a:r>
-              <a:rPr lang="el-GR" sz="1200" dirty="0" smtClean="0"/>
+              <a:rPr lang="el-GR" sz="1200" dirty="0"/>
               <a:t>β</a:t>
             </a:r>
             <a:r>
-              <a:rPr lang="en-GB" sz="1200" dirty="0" smtClean="0"/>
+              <a:rPr lang="en-GB" sz="1200" dirty="0"/>
               <a:t>/g)</a:t>
             </a:r>
             <a:r>
-              <a:rPr lang="en-GB" sz="1200" i="0" dirty="0" smtClean="0">
+              <a:rPr lang="en-GB" sz="1200" i="0" dirty="0">
                 <a:latin typeface="+mn-lt"/>
                 <a:cs typeface="Times New Roman" pitchFamily="18" charset="0"/>
               </a:rPr>
               <a:t> </a:t>
             </a:r>
-            <a:endParaRPr lang="en-US" i="0" dirty="0" smtClean="0">
+            <a:endParaRPr lang="en-US" i="0" dirty="0">
               <a:latin typeface="+mn-lt"/>
               <a:cs typeface="Times New Roman" pitchFamily="18" charset="0"/>
             </a:endParaRPr>
@@ -2102,7 +2102,7 @@
           </a:lstStyle>
           <a:p>
             <a:r>
-              <a:rPr lang="en-US" smtClean="0"/>
+              <a:rPr lang="en-US"/>
               <a:t>Click to edit Master title style</a:t>
             </a:r>
             <a:endParaRPr lang="en-US" dirty="0"/>
@@ -2175,7 +2175,7 @@
           </a:lstStyle>
           <a:p>
             <a:r>
-              <a:rPr lang="en-US" smtClean="0"/>
+              <a:rPr lang="en-US"/>
               <a:t>Click to edit Master subtitle style</a:t>
             </a:r>
             <a:endParaRPr lang="en-US" dirty="0"/>
@@ -2199,7 +2199,7 @@
           <a:p>
             <a:fld id="{C9C4BACD-157C-49D0-94EF-AA1F6A6AD876}" type="datetime1">
               <a:rPr lang="en-US" smtClean="0"/>
-              <a:t>10/5/2018</a:t>
+              <a:t>11/25/2018</a:t>
             </a:fld>
             <a:endParaRPr lang="en-US" dirty="0"/>
           </a:p>
@@ -2293,7 +2293,7 @@
           </a:lstStyle>
           <a:p>
             <a:r>
-              <a:rPr lang="en-US" dirty="0" smtClean="0"/>
+              <a:rPr lang="en-US" dirty="0"/>
               <a:t>Page </a:t>
             </a:r>
             <a:fld id="{8171E6F6-E6A4-4115-9778-B0A1DA8DDBEB}" type="slidenum">
@@ -2315,13 +2315,6 @@
   <p:clrMapOvr>
     <a:masterClrMapping/>
   </p:clrMapOvr>
-  <p:timing>
-    <p:tnLst>
-      <p:par>
-        <p:cTn id="1" dur="indefinite" restart="never" nodeType="tmRoot"/>
-      </p:par>
-    </p:tnLst>
-  </p:timing>
 </p:sldLayout>
 </file>
 
@@ -2358,7 +2351,7 @@
           <a:lstStyle/>
           <a:p>
             <a:r>
-              <a:rPr lang="en-US" smtClean="0"/>
+              <a:rPr lang="en-US"/>
               <a:t>Click to edit Master title style</a:t>
             </a:r>
             <a:endParaRPr lang="en-US" dirty="0"/>
@@ -2382,35 +2375,35 @@
           <a:p>
             <a:pPr lvl="0"/>
             <a:r>
-              <a:rPr lang="en-US" smtClean="0"/>
+              <a:rPr lang="en-US"/>
               <a:t>Edit Master text styles</a:t>
             </a:r>
           </a:p>
           <a:p>
             <a:pPr lvl="1"/>
             <a:r>
-              <a:rPr lang="en-US" smtClean="0"/>
+              <a:rPr lang="en-US"/>
               <a:t>Second level</a:t>
             </a:r>
           </a:p>
           <a:p>
             <a:pPr lvl="2"/>
             <a:r>
-              <a:rPr lang="en-US" smtClean="0"/>
+              <a:rPr lang="en-US"/>
               <a:t>Third level</a:t>
             </a:r>
           </a:p>
           <a:p>
             <a:pPr lvl="3"/>
             <a:r>
-              <a:rPr lang="en-US" smtClean="0"/>
+              <a:rPr lang="en-US"/>
               <a:t>Fourth level</a:t>
             </a:r>
           </a:p>
           <a:p>
             <a:pPr lvl="4"/>
             <a:r>
-              <a:rPr lang="en-US" smtClean="0"/>
+              <a:rPr lang="en-US"/>
               <a:t>Fifth level</a:t>
             </a:r>
             <a:endParaRPr lang="en-US" dirty="0"/>
@@ -2434,7 +2427,7 @@
           <a:p>
             <a:fld id="{2EA1A6BC-11B1-4E16-919A-AFB5EDCD6744}" type="datetime1">
               <a:rPr lang="en-US" smtClean="0"/>
-              <a:t>10/5/2018</a:t>
+              <a:t>11/25/2018</a:t>
             </a:fld>
             <a:endParaRPr lang="en-US" dirty="0"/>
           </a:p>
@@ -2483,7 +2476,7 @@
           </a:lstStyle>
           <a:p>
             <a:r>
-              <a:rPr lang="en-US" smtClean="0"/>
+              <a:rPr lang="en-US"/>
               <a:t>Page </a:t>
             </a:r>
             <a:fld id="{D57F1E4F-1CFF-5643-939E-217C01CDF565}" type="slidenum">
@@ -2505,13 +2498,6 @@
   <p:clrMapOvr>
     <a:masterClrMapping/>
   </p:clrMapOvr>
-  <p:timing>
-    <p:tnLst>
-      <p:par>
-        <p:cTn id="1" dur="indefinite" restart="never" nodeType="tmRoot"/>
-      </p:par>
-    </p:tnLst>
-  </p:timing>
 </p:sldLayout>
 </file>
 
@@ -2553,7 +2539,7 @@
           <a:lstStyle/>
           <a:p>
             <a:r>
-              <a:rPr lang="en-US" smtClean="0"/>
+              <a:rPr lang="en-US"/>
               <a:t>Click to edit Master title style</a:t>
             </a:r>
             <a:endParaRPr lang="en-US" dirty="0"/>
@@ -2582,35 +2568,35 @@
           <a:p>
             <a:pPr lvl="0"/>
             <a:r>
-              <a:rPr lang="en-US" smtClean="0"/>
+              <a:rPr lang="en-US"/>
               <a:t>Edit Master text styles</a:t>
             </a:r>
           </a:p>
           <a:p>
             <a:pPr lvl="1"/>
             <a:r>
-              <a:rPr lang="en-US" smtClean="0"/>
+              <a:rPr lang="en-US"/>
               <a:t>Second level</a:t>
             </a:r>
           </a:p>
           <a:p>
             <a:pPr lvl="2"/>
             <a:r>
-              <a:rPr lang="en-US" smtClean="0"/>
+              <a:rPr lang="en-US"/>
               <a:t>Third level</a:t>
             </a:r>
           </a:p>
           <a:p>
             <a:pPr lvl="3"/>
             <a:r>
-              <a:rPr lang="en-US" smtClean="0"/>
+              <a:rPr lang="en-US"/>
               <a:t>Fourth level</a:t>
             </a:r>
           </a:p>
           <a:p>
             <a:pPr lvl="4"/>
             <a:r>
-              <a:rPr lang="en-US" smtClean="0"/>
+              <a:rPr lang="en-US"/>
               <a:t>Fifth level</a:t>
             </a:r>
             <a:endParaRPr lang="en-US" dirty="0"/>
@@ -2634,7 +2620,7 @@
           <a:p>
             <a:fld id="{7D6B57A0-298C-4132-B714-B2E4F7F5DAD3}" type="datetime1">
               <a:rPr lang="en-US" smtClean="0"/>
-              <a:t>10/5/2018</a:t>
+              <a:t>11/25/2018</a:t>
             </a:fld>
             <a:endParaRPr lang="en-US" dirty="0"/>
           </a:p>
@@ -2693,13 +2679,6 @@
   <p:clrMapOvr>
     <a:masterClrMapping/>
   </p:clrMapOvr>
-  <p:timing>
-    <p:tnLst>
-      <p:par>
-        <p:cTn id="1" dur="indefinite" restart="never" nodeType="tmRoot"/>
-      </p:par>
-    </p:tnLst>
-  </p:timing>
 </p:sldLayout>
 </file>
 
@@ -2747,10 +2726,9 @@
           </a:lstStyle>
           <a:p>
             <a:r>
-              <a:rPr lang="en-US" dirty="0" smtClean="0"/>
+              <a:rPr lang="en-US" dirty="0"/>
               <a:t>Click to edit Master title style</a:t>
             </a:r>
-            <a:endParaRPr lang="en-US" dirty="0"/>
           </a:p>
         </p:txBody>
       </p:sp>
@@ -2836,14 +2814,14 @@
           <a:p>
             <a:pPr lvl="0"/>
             <a:r>
-              <a:rPr lang="en-US" dirty="0" smtClean="0"/>
+              <a:rPr lang="en-US" dirty="0"/>
               <a:t>Edit Master text styles</a:t>
             </a:r>
           </a:p>
           <a:p>
             <a:pPr lvl="1"/>
             <a:r>
-              <a:rPr lang="en-US" dirty="0" smtClean="0"/>
+              <a:rPr lang="en-US" dirty="0"/>
               <a:t>Second level</a:t>
             </a:r>
           </a:p>
@@ -2866,7 +2844,7 @@
           <a:p>
             <a:fld id="{784773E5-5F31-491B-89B9-F93C36036A5D}" type="datetime1">
               <a:rPr lang="en-US" smtClean="0"/>
-              <a:t>10/5/2018</a:t>
+              <a:t>11/25/2018</a:t>
             </a:fld>
             <a:endParaRPr lang="en-US" dirty="0"/>
           </a:p>
@@ -2917,7 +2895,7 @@
           </a:lstStyle>
           <a:p>
             <a:r>
-              <a:rPr lang="en-US" dirty="0" smtClean="0"/>
+              <a:rPr lang="en-US" dirty="0"/>
               <a:t> Page </a:t>
             </a:r>
             <a:fld id="{D57F1E4F-1CFF-5643-939E-217C01CDF565}" type="slidenum">
@@ -2939,13 +2917,6 @@
   <p:clrMapOvr>
     <a:masterClrMapping/>
   </p:clrMapOvr>
-  <p:timing>
-    <p:tnLst>
-      <p:par>
-        <p:cTn id="1" dur="indefinite" restart="never" nodeType="tmRoot"/>
-      </p:par>
-    </p:tnLst>
-  </p:timing>
 </p:sldLayout>
 </file>
 
@@ -3013,10 +2984,9 @@
           </a:lstStyle>
           <a:p>
             <a:r>
-              <a:rPr lang="en-US" dirty="0" smtClean="0"/>
+              <a:rPr lang="en-US" dirty="0"/>
               <a:t>Click to edit Master title style</a:t>
             </a:r>
-            <a:endParaRPr lang="en-US" dirty="0"/>
           </a:p>
         </p:txBody>
       </p:sp>
@@ -3135,7 +3105,7 @@
           <a:p>
             <a:pPr lvl="0"/>
             <a:r>
-              <a:rPr lang="en-US" smtClean="0"/>
+              <a:rPr lang="en-US"/>
               <a:t>Edit Master text styles</a:t>
             </a:r>
           </a:p>
@@ -3158,7 +3128,7 @@
           <a:p>
             <a:fld id="{53800E3F-A486-4059-9240-A559DDCADE81}" type="datetime1">
               <a:rPr lang="en-US" smtClean="0"/>
-              <a:t>10/5/2018</a:t>
+              <a:t>11/25/2018</a:t>
             </a:fld>
             <a:endParaRPr lang="en-US" dirty="0"/>
           </a:p>
@@ -3207,7 +3177,7 @@
           </a:lstStyle>
           <a:p>
             <a:r>
-              <a:rPr lang="en-US" smtClean="0"/>
+              <a:rPr lang="en-US"/>
               <a:t>Page </a:t>
             </a:r>
             <a:fld id="{D57F1E4F-1CFF-5643-939E-217C01CDF565}" type="slidenum">
@@ -3267,13 +3237,6 @@
   <p:clrMapOvr>
     <a:masterClrMapping/>
   </p:clrMapOvr>
-  <p:timing>
-    <p:tnLst>
-      <p:par>
-        <p:cTn id="1" dur="indefinite" restart="never" nodeType="tmRoot"/>
-      </p:par>
-    </p:tnLst>
-  </p:timing>
 </p:sldLayout>
 </file>
 
@@ -3315,7 +3278,7 @@
           <a:lstStyle/>
           <a:p>
             <a:r>
-              <a:rPr lang="en-US" smtClean="0"/>
+              <a:rPr lang="en-US"/>
               <a:t>Click to edit Master title style</a:t>
             </a:r>
             <a:endParaRPr lang="en-US" dirty="0"/>
@@ -3344,35 +3307,35 @@
           <a:p>
             <a:pPr lvl="0"/>
             <a:r>
-              <a:rPr lang="en-US" smtClean="0"/>
+              <a:rPr lang="en-US"/>
               <a:t>Edit Master text styles</a:t>
             </a:r>
           </a:p>
           <a:p>
             <a:pPr lvl="1"/>
             <a:r>
-              <a:rPr lang="en-US" smtClean="0"/>
+              <a:rPr lang="en-US"/>
               <a:t>Second level</a:t>
             </a:r>
           </a:p>
           <a:p>
             <a:pPr lvl="2"/>
             <a:r>
-              <a:rPr lang="en-US" smtClean="0"/>
+              <a:rPr lang="en-US"/>
               <a:t>Third level</a:t>
             </a:r>
           </a:p>
           <a:p>
             <a:pPr lvl="3"/>
             <a:r>
-              <a:rPr lang="en-US" smtClean="0"/>
+              <a:rPr lang="en-US"/>
               <a:t>Fourth level</a:t>
             </a:r>
           </a:p>
           <a:p>
             <a:pPr lvl="4"/>
             <a:r>
-              <a:rPr lang="en-US" smtClean="0"/>
+              <a:rPr lang="en-US"/>
               <a:t>Fifth level</a:t>
             </a:r>
             <a:endParaRPr lang="en-US" dirty="0"/>
@@ -3401,35 +3364,35 @@
           <a:p>
             <a:pPr lvl="0"/>
             <a:r>
-              <a:rPr lang="en-US" smtClean="0"/>
+              <a:rPr lang="en-US"/>
               <a:t>Edit Master text styles</a:t>
             </a:r>
           </a:p>
           <a:p>
             <a:pPr lvl="1"/>
             <a:r>
-              <a:rPr lang="en-US" smtClean="0"/>
+              <a:rPr lang="en-US"/>
               <a:t>Second level</a:t>
             </a:r>
           </a:p>
           <a:p>
             <a:pPr lvl="2"/>
             <a:r>
-              <a:rPr lang="en-US" smtClean="0"/>
+              <a:rPr lang="en-US"/>
               <a:t>Third level</a:t>
             </a:r>
           </a:p>
           <a:p>
             <a:pPr lvl="3"/>
             <a:r>
-              <a:rPr lang="en-US" smtClean="0"/>
+              <a:rPr lang="en-US"/>
               <a:t>Fourth level</a:t>
             </a:r>
           </a:p>
           <a:p>
             <a:pPr lvl="4"/>
             <a:r>
-              <a:rPr lang="en-US" smtClean="0"/>
+              <a:rPr lang="en-US"/>
               <a:t>Fifth level</a:t>
             </a:r>
             <a:endParaRPr lang="en-US" dirty="0"/>
@@ -3453,7 +3416,7 @@
           <a:p>
             <a:fld id="{A9CAAD29-F102-4008-BC34-B05BB0FD2B67}" type="datetime1">
               <a:rPr lang="en-US" smtClean="0"/>
-              <a:t>10/5/2018</a:t>
+              <a:t>11/25/2018</a:t>
             </a:fld>
             <a:endParaRPr lang="en-US" dirty="0"/>
           </a:p>
@@ -3512,13 +3475,6 @@
   <p:clrMapOvr>
     <a:masterClrMapping/>
   </p:clrMapOvr>
-  <p:timing>
-    <p:tnLst>
-      <p:par>
-        <p:cTn id="1" dur="indefinite" restart="never" nodeType="tmRoot"/>
-      </p:par>
-    </p:tnLst>
-  </p:timing>
 </p:sldLayout>
 </file>
 
@@ -3560,7 +3516,7 @@
           <a:lstStyle/>
           <a:p>
             <a:r>
-              <a:rPr lang="en-US" smtClean="0"/>
+              <a:rPr lang="en-US"/>
               <a:t>Click to edit Master title style</a:t>
             </a:r>
             <a:endParaRPr lang="en-US" dirty="0"/>
@@ -3632,7 +3588,7 @@
           <a:p>
             <a:pPr lvl="0"/>
             <a:r>
-              <a:rPr lang="en-US" smtClean="0"/>
+              <a:rPr lang="en-US"/>
               <a:t>Edit Master text styles</a:t>
             </a:r>
           </a:p>
@@ -3660,35 +3616,35 @@
           <a:p>
             <a:pPr lvl="0"/>
             <a:r>
-              <a:rPr lang="en-US" smtClean="0"/>
+              <a:rPr lang="en-US"/>
               <a:t>Edit Master text styles</a:t>
             </a:r>
           </a:p>
           <a:p>
             <a:pPr lvl="1"/>
             <a:r>
-              <a:rPr lang="en-US" smtClean="0"/>
+              <a:rPr lang="en-US"/>
               <a:t>Second level</a:t>
             </a:r>
           </a:p>
           <a:p>
             <a:pPr lvl="2"/>
             <a:r>
-              <a:rPr lang="en-US" smtClean="0"/>
+              <a:rPr lang="en-US"/>
               <a:t>Third level</a:t>
             </a:r>
           </a:p>
           <a:p>
             <a:pPr lvl="3"/>
             <a:r>
-              <a:rPr lang="en-US" smtClean="0"/>
+              <a:rPr lang="en-US"/>
               <a:t>Fourth level</a:t>
             </a:r>
           </a:p>
           <a:p>
             <a:pPr lvl="4"/>
             <a:r>
-              <a:rPr lang="en-US" smtClean="0"/>
+              <a:rPr lang="en-US"/>
               <a:t>Fifth level</a:t>
             </a:r>
             <a:endParaRPr lang="en-US" dirty="0"/>
@@ -3760,7 +3716,7 @@
           <a:p>
             <a:pPr lvl="0"/>
             <a:r>
-              <a:rPr lang="en-US" smtClean="0"/>
+              <a:rPr lang="en-US"/>
               <a:t>Edit Master text styles</a:t>
             </a:r>
           </a:p>
@@ -3788,35 +3744,35 @@
           <a:p>
             <a:pPr lvl="0"/>
             <a:r>
-              <a:rPr lang="en-US" smtClean="0"/>
+              <a:rPr lang="en-US"/>
               <a:t>Edit Master text styles</a:t>
             </a:r>
           </a:p>
           <a:p>
             <a:pPr lvl="1"/>
             <a:r>
-              <a:rPr lang="en-US" smtClean="0"/>
+              <a:rPr lang="en-US"/>
               <a:t>Second level</a:t>
             </a:r>
           </a:p>
           <a:p>
             <a:pPr lvl="2"/>
             <a:r>
-              <a:rPr lang="en-US" smtClean="0"/>
+              <a:rPr lang="en-US"/>
               <a:t>Third level</a:t>
             </a:r>
           </a:p>
           <a:p>
             <a:pPr lvl="3"/>
             <a:r>
-              <a:rPr lang="en-US" smtClean="0"/>
+              <a:rPr lang="en-US"/>
               <a:t>Fourth level</a:t>
             </a:r>
           </a:p>
           <a:p>
             <a:pPr lvl="4"/>
             <a:r>
-              <a:rPr lang="en-US" smtClean="0"/>
+              <a:rPr lang="en-US"/>
               <a:t>Fifth level</a:t>
             </a:r>
             <a:endParaRPr lang="en-US" dirty="0"/>
@@ -3840,7 +3796,7 @@
           <a:p>
             <a:fld id="{D93354DC-EF94-4EEC-9481-FB469B037A91}" type="datetime1">
               <a:rPr lang="en-US" smtClean="0"/>
-              <a:t>10/5/2018</a:t>
+              <a:t>11/25/2018</a:t>
             </a:fld>
             <a:endParaRPr lang="en-US" dirty="0"/>
           </a:p>
@@ -3899,13 +3855,6 @@
   <p:clrMapOvr>
     <a:masterClrMapping/>
   </p:clrMapOvr>
-  <p:timing>
-    <p:tnLst>
-      <p:par>
-        <p:cTn id="1" dur="indefinite" restart="never" nodeType="tmRoot"/>
-      </p:par>
-    </p:tnLst>
-  </p:timing>
 </p:sldLayout>
 </file>
 
@@ -3942,7 +3891,7 @@
           <a:lstStyle/>
           <a:p>
             <a:r>
-              <a:rPr lang="en-US" smtClean="0"/>
+              <a:rPr lang="en-US"/>
               <a:t>Click to edit Master title style</a:t>
             </a:r>
             <a:endParaRPr lang="en-US" dirty="0"/>
@@ -3966,7 +3915,7 @@
           <a:p>
             <a:fld id="{D9254362-7AEE-43C5-AEE4-AC33DABFA22C}" type="datetime1">
               <a:rPr lang="en-US" smtClean="0"/>
-              <a:t>10/5/2018</a:t>
+              <a:t>11/25/2018</a:t>
             </a:fld>
             <a:endParaRPr lang="en-US" dirty="0"/>
           </a:p>
@@ -4015,7 +3964,7 @@
           </a:lstStyle>
           <a:p>
             <a:r>
-              <a:rPr lang="en-US" smtClean="0"/>
+              <a:rPr lang="en-US"/>
               <a:t>Page </a:t>
             </a:r>
             <a:fld id="{D57F1E4F-1CFF-5643-939E-217C01CDF565}" type="slidenum">
@@ -4037,13 +3986,6 @@
   <p:clrMapOvr>
     <a:masterClrMapping/>
   </p:clrMapOvr>
-  <p:timing>
-    <p:tnLst>
-      <p:par>
-        <p:cTn id="1" dur="indefinite" restart="never" nodeType="tmRoot"/>
-      </p:par>
-    </p:tnLst>
-  </p:timing>
 </p:sldLayout>
 </file>
 
@@ -4081,7 +4023,7 @@
           <a:p>
             <a:fld id="{11099A4A-02E7-4A08-B2C5-E4EBFFB64A84}" type="datetime1">
               <a:rPr lang="en-US" smtClean="0"/>
-              <a:t>10/5/2018</a:t>
+              <a:t>11/25/2018</a:t>
             </a:fld>
             <a:endParaRPr lang="en-US" dirty="0"/>
           </a:p>
@@ -4138,7 +4080,7 @@
           </a:lstStyle>
           <a:p>
             <a:r>
-              <a:rPr lang="en-US" smtClean="0"/>
+              <a:rPr lang="en-US"/>
               <a:t>Page </a:t>
             </a:r>
             <a:fld id="{D57F1E4F-1CFF-5643-939E-217C01CDF565}" type="slidenum">
@@ -4160,13 +4102,6 @@
   <p:clrMapOvr>
     <a:masterClrMapping/>
   </p:clrMapOvr>
-  <p:timing>
-    <p:tnLst>
-      <p:par>
-        <p:cTn id="1" dur="indefinite" restart="never" nodeType="tmRoot"/>
-      </p:par>
-    </p:tnLst>
-  </p:timing>
 </p:sldLayout>
 </file>
 
@@ -4294,7 +4229,7 @@
           </a:lstStyle>
           <a:p>
             <a:r>
-              <a:rPr lang="en-US" smtClean="0"/>
+              <a:rPr lang="en-US"/>
               <a:t>Click to edit Master title style</a:t>
             </a:r>
             <a:endParaRPr lang="en-US" dirty="0"/>
@@ -4323,35 +4258,35 @@
           <a:p>
             <a:pPr lvl="0"/>
             <a:r>
-              <a:rPr lang="en-US" smtClean="0"/>
+              <a:rPr lang="en-US"/>
               <a:t>Edit Master text styles</a:t>
             </a:r>
           </a:p>
           <a:p>
             <a:pPr lvl="1"/>
             <a:r>
-              <a:rPr lang="en-US" smtClean="0"/>
+              <a:rPr lang="en-US"/>
               <a:t>Second level</a:t>
             </a:r>
           </a:p>
           <a:p>
             <a:pPr lvl="2"/>
             <a:r>
-              <a:rPr lang="en-US" smtClean="0"/>
+              <a:rPr lang="en-US"/>
               <a:t>Third level</a:t>
             </a:r>
           </a:p>
           <a:p>
             <a:pPr lvl="3"/>
             <a:r>
-              <a:rPr lang="en-US" smtClean="0"/>
+              <a:rPr lang="en-US"/>
               <a:t>Fourth level</a:t>
             </a:r>
           </a:p>
           <a:p>
             <a:pPr lvl="4"/>
             <a:r>
-              <a:rPr lang="en-US" smtClean="0"/>
+              <a:rPr lang="en-US"/>
               <a:t>Fifth level</a:t>
             </a:r>
             <a:endParaRPr lang="en-US" dirty="0"/>
@@ -4423,7 +4358,7 @@
           <a:p>
             <a:pPr lvl="0"/>
             <a:r>
-              <a:rPr lang="en-US" smtClean="0"/>
+              <a:rPr lang="en-US"/>
               <a:t>Edit Master text styles</a:t>
             </a:r>
           </a:p>
@@ -4455,7 +4390,7 @@
           <a:p>
             <a:fld id="{39203F7C-D20A-49F8-B888-2E46A7855A5C}" type="datetime1">
               <a:rPr lang="en-US" smtClean="0"/>
-              <a:t>10/5/2018</a:t>
+              <a:t>11/25/2018</a:t>
             </a:fld>
             <a:endParaRPr lang="en-US" dirty="0"/>
           </a:p>
@@ -4535,13 +4470,6 @@
   <p:clrMapOvr>
     <a:masterClrMapping/>
   </p:clrMapOvr>
-  <p:timing>
-    <p:tnLst>
-      <p:par>
-        <p:cTn id="1" dur="indefinite" restart="never" nodeType="tmRoot"/>
-      </p:par>
-    </p:tnLst>
-  </p:timing>
 </p:sldLayout>
 </file>
 
@@ -4669,7 +4597,7 @@
           </a:lstStyle>
           <a:p>
             <a:r>
-              <a:rPr lang="en-US" smtClean="0"/>
+              <a:rPr lang="en-US"/>
               <a:t>Click to edit Master title style</a:t>
             </a:r>
             <a:endParaRPr lang="en-US" dirty="0"/>
@@ -4744,7 +4672,7 @@
           </a:lstStyle>
           <a:p>
             <a:r>
-              <a:rPr lang="en-US" smtClean="0"/>
+              <a:rPr lang="en-US"/>
               <a:t>Click icon to add picture</a:t>
             </a:r>
             <a:endParaRPr lang="en-US" dirty="0"/>
@@ -4822,7 +4750,7 @@
           <a:p>
             <a:pPr lvl="0"/>
             <a:r>
-              <a:rPr lang="en-US" smtClean="0"/>
+              <a:rPr lang="en-US"/>
               <a:t>Edit Master text styles</a:t>
             </a:r>
           </a:p>
@@ -4845,7 +4773,7 @@
           <a:p>
             <a:fld id="{748DD5FD-15BD-4496-BE9E-D1DBB8EB5739}" type="datetime1">
               <a:rPr lang="en-US" smtClean="0"/>
-              <a:t>10/5/2018</a:t>
+              <a:t>11/25/2018</a:t>
             </a:fld>
             <a:endParaRPr lang="en-US" dirty="0"/>
           </a:p>
@@ -4904,13 +4832,6 @@
   <p:clrMapOvr>
     <a:masterClrMapping/>
   </p:clrMapOvr>
-  <p:timing>
-    <p:tnLst>
-      <p:par>
-        <p:cTn id="1" dur="indefinite" restart="never" nodeType="tmRoot"/>
-      </p:par>
-    </p:tnLst>
-  </p:timing>
 </p:sldLayout>
 </file>
 
@@ -4962,10 +4883,9 @@
           <a:lstStyle/>
           <a:p>
             <a:r>
-              <a:rPr lang="en-US" dirty="0" smtClean="0"/>
+              <a:rPr lang="en-US" dirty="0"/>
               <a:t>Click to edit Master title style</a:t>
             </a:r>
-            <a:endParaRPr lang="en-US" dirty="0"/>
           </a:p>
         </p:txBody>
       </p:sp>
@@ -4996,38 +4916,37 @@
           <a:p>
             <a:pPr lvl="0"/>
             <a:r>
-              <a:rPr lang="en-US" dirty="0" smtClean="0"/>
+              <a:rPr lang="en-US" dirty="0"/>
               <a:t>Edit Master text styles</a:t>
             </a:r>
           </a:p>
           <a:p>
             <a:pPr lvl="1"/>
             <a:r>
-              <a:rPr lang="en-US" dirty="0" smtClean="0"/>
+              <a:rPr lang="en-US" dirty="0"/>
               <a:t>Second level</a:t>
             </a:r>
           </a:p>
           <a:p>
             <a:pPr lvl="2"/>
             <a:r>
-              <a:rPr lang="en-US" dirty="0" smtClean="0"/>
+              <a:rPr lang="en-US" dirty="0"/>
               <a:t>Third level</a:t>
             </a:r>
           </a:p>
           <a:p>
             <a:pPr lvl="3"/>
             <a:r>
-              <a:rPr lang="en-US" dirty="0" smtClean="0"/>
+              <a:rPr lang="en-US" dirty="0"/>
               <a:t>Fourth level</a:t>
             </a:r>
           </a:p>
           <a:p>
             <a:pPr lvl="4"/>
             <a:r>
-              <a:rPr lang="en-US" dirty="0" smtClean="0"/>
+              <a:rPr lang="en-US" dirty="0"/>
               <a:t>Fifth level</a:t>
             </a:r>
-            <a:endParaRPr lang="en-US" dirty="0"/>
           </a:p>
         </p:txBody>
       </p:sp>
@@ -5064,7 +4983,7 @@
           <a:p>
             <a:fld id="{4D3E5F9C-F2B8-4D4B-8FB9-614589F410D4}" type="datetime1">
               <a:rPr lang="en-US" smtClean="0"/>
-              <a:t>10/5/2018</a:t>
+              <a:t>11/25/2018</a:t>
             </a:fld>
             <a:endParaRPr lang="en-US" dirty="0"/>
           </a:p>
@@ -5201,13 +5120,6 @@
     <p:sldLayoutId id="2147483675" r:id="rId10"/>
     <p:sldLayoutId id="2147483676" r:id="rId11"/>
   </p:sldLayoutIdLst>
-  <p:timing>
-    <p:tnLst>
-      <p:par>
-        <p:cTn id="1" dur="indefinite" restart="never" nodeType="tmRoot"/>
-      </p:par>
-    </p:tnLst>
-  </p:timing>
   <p:hf hdr="0" ftr="0" dt="0"/>
   <p:txStyles>
     <p:titleStyle>
@@ -5636,10 +5548,9 @@
           <a:lstStyle/>
           <a:p>
             <a:r>
-              <a:rPr lang="en-SG" dirty="0" smtClean="0"/>
+              <a:rPr lang="en-SG" dirty="0"/>
               <a:t>Dynamics</a:t>
             </a:r>
-            <a:endParaRPr lang="en-SG" dirty="0"/>
           </a:p>
         </p:txBody>
       </p:sp>
@@ -5659,7 +5570,7 @@
           <a:lstStyle/>
           <a:p>
             <a:r>
-              <a:rPr lang="en-US" smtClean="0"/>
+              <a:rPr lang="en-US"/>
               <a:t>Page </a:t>
             </a:r>
             <a:fld id="{8171E6F6-E6A4-4115-9778-B0A1DA8DDBEB}" type="slidenum">
@@ -5681,13 +5592,6 @@
   <p:clrMapOvr>
     <a:masterClrMapping/>
   </p:clrMapOvr>
-  <p:timing>
-    <p:tnLst>
-      <p:par>
-        <p:cTn id="1" dur="indefinite" restart="never" nodeType="tmRoot"/>
-      </p:par>
-    </p:tnLst>
-  </p:timing>
 </p:sld>
 </file>
 
@@ -5849,7 +5753,7 @@
           <a:lstStyle/>
           <a:p>
             <a:r>
-              <a:rPr lang="en-US" smtClean="0"/>
+              <a:rPr lang="en-US"/>
               <a:t> Page </a:t>
             </a:r>
             <a:fld id="{D57F1E4F-1CFF-5643-939E-217C01CDF565}" type="slidenum">
@@ -5961,13 +5865,6 @@
   <p:clrMapOvr>
     <a:masterClrMapping/>
   </p:clrMapOvr>
-  <p:timing>
-    <p:tnLst>
-      <p:par>
-        <p:cTn id="1" dur="indefinite" restart="never" nodeType="tmRoot"/>
-      </p:par>
-    </p:tnLst>
-  </p:timing>
 </p:sld>
 </file>
 
@@ -6090,12 +5987,8 @@
               </a:lnSpc>
             </a:pPr>
             <a:r>
-              <a:rPr lang="en-US" dirty="0" smtClean="0"/>
-              <a:t>The </a:t>
-            </a:r>
-            <a:r>
               <a:rPr lang="en-US" dirty="0"/>
-              <a:t>above equation is valid only if the </a:t>
+              <a:t>The above equation is valid only if the </a:t>
             </a:r>
             <a:r>
               <a:rPr lang="en-US" dirty="0">
@@ -6126,13 +6019,8 @@
             </a:pPr>
             <a:r>
               <a:rPr lang="en-US" dirty="0"/>
-              <a:t>In component form </a:t>
-            </a:r>
-            <a:r>
-              <a:rPr lang="en-US" dirty="0" smtClean="0"/>
-              <a:t>                                                           .</a:t>
-            </a:r>
-            <a:endParaRPr lang="en-US" dirty="0"/>
+              <a:t>In component form                                                            .</a:t>
+            </a:r>
           </a:p>
         </p:txBody>
       </p:sp>
@@ -6152,7 +6040,7 @@
           <a:lstStyle/>
           <a:p>
             <a:r>
-              <a:rPr lang="en-US" smtClean="0"/>
+              <a:rPr lang="en-US"/>
               <a:t> Page </a:t>
             </a:r>
             <a:fld id="{D57F1E4F-1CFF-5643-939E-217C01CDF565}" type="slidenum">
@@ -6186,7 +6074,7 @@
           <a:graphicData uri="http://schemas.openxmlformats.org/presentationml/2006/ole">
             <mc:AlternateContent xmlns:mc="http://schemas.openxmlformats.org/markup-compatibility/2006">
               <mc:Choice xmlns:v="urn:schemas-microsoft-com:vml" Requires="v">
-                <p:oleObj spid="_x0000_s246858" name="Equation" r:id="rId3" imgW="4431960" imgH="431640" progId="Equation.DSMT4">
+                <p:oleObj spid="_x0000_s246862" name="Equation" r:id="rId3" imgW="4431960" imgH="431640" progId="Equation.DSMT4">
                   <p:embed/>
                 </p:oleObj>
               </mc:Choice>
@@ -6256,7 +6144,7 @@
           <a:graphicData uri="http://schemas.openxmlformats.org/presentationml/2006/ole">
             <mc:AlternateContent xmlns:mc="http://schemas.openxmlformats.org/markup-compatibility/2006">
               <mc:Choice xmlns:v="urn:schemas-microsoft-com:vml" Requires="v">
-                <p:oleObj spid="_x0000_s246859" name="Equation" r:id="rId5" imgW="2120760" imgH="723600" progId="Equation.DSMT4">
+                <p:oleObj spid="_x0000_s246863" name="Equation" r:id="rId5" imgW="2120760" imgH="723600" progId="Equation.DSMT4">
                   <p:embed/>
                 </p:oleObj>
               </mc:Choice>
@@ -6314,13 +6202,6 @@
   <p:clrMapOvr>
     <a:masterClrMapping/>
   </p:clrMapOvr>
-  <p:timing>
-    <p:tnLst>
-      <p:par>
-        <p:cTn id="1" dur="indefinite" restart="never" nodeType="tmRoot"/>
-      </p:par>
-    </p:tnLst>
-  </p:timing>
 </p:sld>
 </file>
 
@@ -6460,14 +6341,10 @@
             </a:pPr>
             <a:r>
               <a:rPr lang="en-GB" dirty="0"/>
-              <a:t>Mathematically, 1 N = </a:t>
-            </a:r>
-            <a:r>
-              <a:rPr lang="en-GB" dirty="0" smtClean="0"/>
-              <a:t>1kg m/s</a:t>
-            </a:r>
-            <a:r>
-              <a:rPr lang="en-GB" baseline="30000" dirty="0" smtClean="0"/>
+              <a:t>Mathematically, 1 N = 1kg m/s</a:t>
+            </a:r>
+            <a:r>
+              <a:rPr lang="en-GB" baseline="30000" dirty="0"/>
               <a:t>2</a:t>
             </a:r>
             <a:endParaRPr lang="en-US" baseline="30000" dirty="0"/>
@@ -6496,7 +6373,7 @@
           <a:lstStyle/>
           <a:p>
             <a:r>
-              <a:rPr lang="en-US" smtClean="0"/>
+              <a:rPr lang="en-US"/>
               <a:t> Page </a:t>
             </a:r>
             <a:fld id="{D57F1E4F-1CFF-5643-939E-217C01CDF565}" type="slidenum">
@@ -6518,13 +6395,6 @@
   <p:clrMapOvr>
     <a:masterClrMapping/>
   </p:clrMapOvr>
-  <p:timing>
-    <p:tnLst>
-      <p:par>
-        <p:cTn id="1" dur="indefinite" restart="never" nodeType="tmRoot"/>
-      </p:par>
-    </p:tnLst>
-  </p:timing>
 </p:sld>
 </file>
 
@@ -6641,21 +6511,8 @@
             </a:r>
             <a:r>
               <a:rPr lang="en-US" dirty="0"/>
-              <a:t> under gravity, </a:t>
-            </a:r>
-            <a:r>
-              <a:rPr lang="en-US" dirty="0" smtClean="0"/>
-              <a:t>according </a:t>
-            </a:r>
-            <a:r>
-              <a:rPr lang="en-US" dirty="0"/>
-              <a:t>to Newton’s second law, the force acting on it must be,             </a:t>
-            </a:r>
-            <a:r>
-              <a:rPr lang="en-US" dirty="0" smtClean="0"/>
-              <a:t>.</a:t>
-            </a:r>
-            <a:endParaRPr lang="en-US" dirty="0"/>
+              <a:t> under gravity, according to Newton’s second law, the force acting on it must be,             .</a:t>
+            </a:r>
           </a:p>
           <a:p>
             <a:pPr>
@@ -6665,11 +6522,7 @@
             </a:pPr>
             <a:r>
               <a:rPr lang="en-GB" dirty="0"/>
-              <a:t>This force is called the weight of the object</a:t>
-            </a:r>
-            <a:r>
-              <a:rPr lang="en-GB" dirty="0" smtClean="0"/>
-              <a:t>,              .</a:t>
+              <a:t>This force is called the weight of the object,              .</a:t>
             </a:r>
             <a:endParaRPr lang="en-SG" dirty="0"/>
           </a:p>
@@ -6691,7 +6544,7 @@
           <a:lstStyle/>
           <a:p>
             <a:r>
-              <a:rPr lang="en-US" smtClean="0"/>
+              <a:rPr lang="en-US"/>
               <a:t> Page </a:t>
             </a:r>
             <a:fld id="{D57F1E4F-1CFF-5643-939E-217C01CDF565}" type="slidenum">
@@ -6725,7 +6578,7 @@
           <a:graphicData uri="http://schemas.openxmlformats.org/presentationml/2006/ole">
             <mc:AlternateContent xmlns:mc="http://schemas.openxmlformats.org/markup-compatibility/2006">
               <mc:Choice xmlns:v="urn:schemas-microsoft-com:vml" Requires="v">
-                <p:oleObj spid="_x0000_s247878" name="Equation" r:id="rId3" imgW="1002960" imgH="431640" progId="Equation.DSMT4">
+                <p:oleObj spid="_x0000_s247882" name="Equation" r:id="rId3" imgW="1002960" imgH="431640" progId="Equation.DSMT4">
                   <p:embed/>
                 </p:oleObj>
               </mc:Choice>
@@ -6795,7 +6648,7 @@
           <a:graphicData uri="http://schemas.openxmlformats.org/presentationml/2006/ole">
             <mc:AlternateContent xmlns:mc="http://schemas.openxmlformats.org/markup-compatibility/2006">
               <mc:Choice xmlns:v="urn:schemas-microsoft-com:vml" Requires="v">
-                <p:oleObj spid="_x0000_s247879" name="Equation" r:id="rId5" imgW="952200" imgH="431640" progId="Equation.DSMT4">
+                <p:oleObj spid="_x0000_s247883" name="Equation" r:id="rId5" imgW="952200" imgH="431640" progId="Equation.DSMT4">
                   <p:embed/>
                 </p:oleObj>
               </mc:Choice>
@@ -6853,13 +6706,6 @@
   <p:clrMapOvr>
     <a:masterClrMapping/>
   </p:clrMapOvr>
-  <p:timing>
-    <p:tnLst>
-      <p:par>
-        <p:cTn id="1" dur="indefinite" restart="never" nodeType="tmRoot"/>
-      </p:par>
-    </p:tnLst>
-  </p:timing>
 </p:sld>
 </file>
 
@@ -6986,7 +6832,7 @@
           <a:lstStyle/>
           <a:p>
             <a:r>
-              <a:rPr lang="en-US" smtClean="0"/>
+              <a:rPr lang="en-US"/>
               <a:t> Page </a:t>
             </a:r>
             <a:fld id="{D57F1E4F-1CFF-5643-939E-217C01CDF565}" type="slidenum">
@@ -7020,7 +6866,7 @@
           <a:graphicData uri="http://schemas.openxmlformats.org/presentationml/2006/ole">
             <mc:AlternateContent xmlns:mc="http://schemas.openxmlformats.org/markup-compatibility/2006">
               <mc:Choice xmlns:v="urn:schemas-microsoft-com:vml" Requires="v">
-                <p:oleObj spid="_x0000_s248866" name="Equation" r:id="rId3" imgW="2273040" imgH="431640" progId="Equation.DSMT4">
+                <p:oleObj spid="_x0000_s248868" name="Equation" r:id="rId3" imgW="2273040" imgH="431640" progId="Equation.DSMT4">
                   <p:embed/>
                 </p:oleObj>
               </mc:Choice>
@@ -7078,13 +6924,6 @@
   <p:clrMapOvr>
     <a:masterClrMapping/>
   </p:clrMapOvr>
-  <p:timing>
-    <p:tnLst>
-      <p:par>
-        <p:cTn id="1" dur="indefinite" restart="never" nodeType="tmRoot"/>
-      </p:par>
-    </p:tnLst>
-  </p:timing>
 </p:sld>
 </file>
 
@@ -7126,14 +6965,10 @@
             </a:r>
             <a:r>
               <a:rPr lang="en-US"/>
-              <a:t>in </a:t>
-            </a:r>
-            <a:r>
-              <a:rPr lang="en-US" smtClean="0"/>
-              <a:t>a non-inertial </a:t>
-            </a:r>
-            <a:r>
-              <a:rPr lang="en-US" dirty="0" smtClean="0"/>
+              <a:t>in a non-inertial </a:t>
+            </a:r>
+            <a:r>
+              <a:rPr lang="en-US" dirty="0"/>
               <a:t>frame</a:t>
             </a:r>
             <a:endParaRPr lang="en-SG" dirty="0"/>
@@ -7287,7 +7122,7 @@
           <a:lstStyle/>
           <a:p>
             <a:r>
-              <a:rPr lang="en-US" smtClean="0"/>
+              <a:rPr lang="en-US"/>
               <a:t> Page </a:t>
             </a:r>
             <a:fld id="{D57F1E4F-1CFF-5643-939E-217C01CDF565}" type="slidenum">
@@ -7309,13 +7144,6 @@
   <p:clrMapOvr>
     <a:masterClrMapping/>
   </p:clrMapOvr>
-  <p:timing>
-    <p:tnLst>
-      <p:par>
-        <p:cTn id="1" dur="indefinite" restart="never" nodeType="tmRoot"/>
-      </p:par>
-    </p:tnLst>
-  </p:timing>
 </p:sld>
 </file>
 
@@ -7353,11 +7181,7 @@
           <a:p>
             <a:r>
               <a:rPr lang="en-GB" dirty="0"/>
-              <a:t>Example </a:t>
-            </a:r>
-            <a:r>
-              <a:rPr lang="en-GB" dirty="0" smtClean="0"/>
-              <a:t>1</a:t>
+              <a:t>Example 1</a:t>
             </a:r>
             <a:endParaRPr lang="en-SG" dirty="0"/>
           </a:p>
@@ -7423,16 +7247,8 @@
               </a:tabLst>
             </a:pPr>
             <a:r>
-              <a:rPr lang="en-GB" sz="2000" dirty="0" smtClean="0"/>
-              <a:t>(ii) 	What </a:t>
-            </a:r>
-            <a:r>
               <a:rPr lang="en-GB" sz="2000" dirty="0"/>
-              <a:t>is the reaction force to each of the forces acting on the apple</a:t>
-            </a:r>
-            <a:r>
-              <a:rPr lang="en-GB" sz="2000" dirty="0" smtClean="0"/>
-              <a:t>?</a:t>
+              <a:t>(ii) 	What is the reaction force to each of the forces acting on the apple?</a:t>
             </a:r>
           </a:p>
           <a:p>
@@ -7446,7 +7262,7 @@
               </a:tabLst>
             </a:pPr>
             <a:r>
-              <a:rPr lang="en-SG" sz="2000" dirty="0" smtClean="0"/>
+              <a:rPr lang="en-SG" sz="2000" dirty="0"/>
               <a:t>(iii)	</a:t>
             </a:r>
             <a:r>
@@ -7485,7 +7301,7 @@
           <a:lstStyle/>
           <a:p>
             <a:r>
-              <a:rPr lang="en-US" smtClean="0"/>
+              <a:rPr lang="en-US"/>
               <a:t> Page </a:t>
             </a:r>
             <a:fld id="{D57F1E4F-1CFF-5643-939E-217C01CDF565}" type="slidenum">
@@ -7644,10 +7460,9 @@
           <a:lstStyle/>
           <a:p>
             <a:r>
-              <a:rPr lang="en-SG" dirty="0" smtClean="0"/>
+              <a:rPr lang="en-SG" dirty="0"/>
               <a:t>Example 2</a:t>
             </a:r>
-            <a:endParaRPr lang="en-SG" dirty="0"/>
           </a:p>
         </p:txBody>
       </p:sp>
@@ -7734,7 +7549,7 @@
           <a:lstStyle/>
           <a:p>
             <a:r>
-              <a:rPr lang="en-US" smtClean="0"/>
+              <a:rPr lang="en-US"/>
               <a:t> Page </a:t>
             </a:r>
             <a:fld id="{D57F1E4F-1CFF-5643-939E-217C01CDF565}" type="slidenum">
@@ -8126,15 +7941,7 @@
             </a:r>
             <a:r>
               <a:rPr lang="en-US" dirty="0"/>
-              <a:t> bodies. </a:t>
-            </a:r>
-            <a:r>
-              <a:rPr lang="en-US" dirty="0" smtClean="0"/>
-              <a:t>Forces </a:t>
-            </a:r>
-            <a:r>
-              <a:rPr lang="en-US" dirty="0"/>
-              <a:t>that the object of interest exerts </a:t>
+              <a:t> bodies. Forces that the object of interest exerts </a:t>
             </a:r>
             <a:r>
               <a:rPr lang="en-US" dirty="0">
@@ -8158,13 +7965,8 @@
             </a:r>
             <a:r>
               <a:rPr lang="en-US" dirty="0"/>
-              <a:t> </a:t>
-            </a:r>
-            <a:r>
-              <a:rPr lang="en-US" dirty="0" smtClean="0"/>
-              <a:t>bodies are not included. </a:t>
-            </a:r>
-            <a:endParaRPr lang="en-US" dirty="0"/>
+              <a:t> bodies are not included. </a:t>
+            </a:r>
           </a:p>
           <a:p>
             <a:pPr>
@@ -8195,7 +7997,7 @@
           <a:lstStyle/>
           <a:p>
             <a:r>
-              <a:rPr lang="en-US" smtClean="0"/>
+              <a:rPr lang="en-US"/>
               <a:t> Page </a:t>
             </a:r>
             <a:fld id="{D57F1E4F-1CFF-5643-939E-217C01CDF565}" type="slidenum">
@@ -8249,13 +8051,6 @@
   <p:clrMapOvr>
     <a:masterClrMapping/>
   </p:clrMapOvr>
-  <p:timing>
-    <p:tnLst>
-      <p:par>
-        <p:cTn id="1" dur="indefinite" restart="never" nodeType="tmRoot"/>
-      </p:par>
-    </p:tnLst>
-  </p:timing>
 </p:sld>
 </file>
 
@@ -8343,7 +8138,7 @@
           <a:lstStyle/>
           <a:p>
             <a:r>
-              <a:rPr lang="en-US" smtClean="0"/>
+              <a:rPr lang="en-US"/>
               <a:t> Page </a:t>
             </a:r>
             <a:fld id="{D57F1E4F-1CFF-5643-939E-217C01CDF565}" type="slidenum">
@@ -8502,10 +8297,9 @@
           <a:lstStyle/>
           <a:p>
             <a:r>
-              <a:rPr lang="en-SG" dirty="0" smtClean="0"/>
+              <a:rPr lang="en-SG" dirty="0"/>
               <a:t>Dynamics</a:t>
             </a:r>
-            <a:endParaRPr lang="en-SG" dirty="0"/>
           </a:p>
         </p:txBody>
       </p:sp>
@@ -8673,7 +8467,7 @@
           <a:lstStyle/>
           <a:p>
             <a:r>
-              <a:rPr lang="en-US" smtClean="0"/>
+              <a:rPr lang="en-US"/>
               <a:t> Page </a:t>
             </a:r>
             <a:fld id="{D57F1E4F-1CFF-5643-939E-217C01CDF565}" type="slidenum">
@@ -8695,13 +8489,6 @@
   <p:clrMapOvr>
     <a:masterClrMapping/>
   </p:clrMapOvr>
-  <p:timing>
-    <p:tnLst>
-      <p:par>
-        <p:cTn id="1" dur="indefinite" restart="never" nodeType="tmRoot"/>
-      </p:par>
-    </p:tnLst>
-  </p:timing>
 </p:sld>
 </file>
 
@@ -8739,11 +8526,7 @@
           <a:p>
             <a:r>
               <a:rPr lang="en-GB" dirty="0"/>
-              <a:t>Example </a:t>
-            </a:r>
-            <a:r>
-              <a:rPr lang="en-GB" dirty="0" smtClean="0"/>
-              <a:t>4</a:t>
+              <a:t>Example 4</a:t>
             </a:r>
             <a:endParaRPr lang="en-SG" dirty="0"/>
           </a:p>
@@ -8831,12 +8614,8 @@
               <a:buNone/>
             </a:pPr>
             <a:r>
-              <a:rPr lang="en-US" sz="2000" dirty="0" smtClean="0"/>
-              <a:t>If </a:t>
-            </a:r>
-            <a:r>
               <a:rPr lang="en-US" sz="2000" dirty="0"/>
-              <a:t>we consider mass B, it is acted on by only the tension </a:t>
+              <a:t>If we consider mass B, it is acted on by only the tension </a:t>
             </a:r>
             <a:r>
               <a:rPr lang="en-US" sz="2000" i="1" dirty="0"/>
@@ -8887,7 +8666,7 @@
           <a:lstStyle/>
           <a:p>
             <a:r>
-              <a:rPr lang="en-US" smtClean="0"/>
+              <a:rPr lang="en-US"/>
               <a:t> Page </a:t>
             </a:r>
             <a:fld id="{D57F1E4F-1CFF-5643-939E-217C01CDF565}" type="slidenum">
@@ -8989,15 +8768,7 @@
                   <a:ea typeface="SimSun" pitchFamily="2" charset="-122"/>
                   <a:cs typeface="Times New Roman" panose="02020603050405020304" pitchFamily="18" charset="0"/>
                 </a:rPr>
-                <a:t>10 </a:t>
-              </a:r>
-              <a:r>
-                <a:rPr lang="en-GB" altLang="zh-CN" dirty="0">
-                  <a:latin typeface="Times New Roman" panose="02020603050405020304" pitchFamily="18" charset="0"/>
-                  <a:ea typeface="SimSun" pitchFamily="2" charset="-122"/>
-                  <a:cs typeface="Times New Roman" panose="02020603050405020304" pitchFamily="18" charset="0"/>
-                </a:rPr>
-                <a:t>kg</a:t>
+                <a:t>10 kg</a:t>
               </a:r>
               <a:endParaRPr lang="en-GB" dirty="0">
                 <a:latin typeface="Times New Roman" panose="02020603050405020304" pitchFamily="18" charset="0"/>
@@ -9556,15 +9327,7 @@
                   <a:ea typeface="SimSun" pitchFamily="2" charset="-122"/>
                   <a:cs typeface="Times New Roman" panose="02020603050405020304" pitchFamily="18" charset="0"/>
                 </a:rPr>
-                <a:t>10 </a:t>
-              </a:r>
-              <a:r>
-                <a:rPr lang="en-GB" altLang="zh-CN" sz="2000" dirty="0">
-                  <a:latin typeface="Times New Roman" panose="02020603050405020304" pitchFamily="18" charset="0"/>
-                  <a:ea typeface="SimSun" pitchFamily="2" charset="-122"/>
-                  <a:cs typeface="Times New Roman" panose="02020603050405020304" pitchFamily="18" charset="0"/>
-                </a:rPr>
-                <a:t>kg</a:t>
+                <a:t>10 kg</a:t>
               </a:r>
               <a:endParaRPr lang="en-GB" sz="2000" dirty="0">
                 <a:latin typeface="Times New Roman" panose="02020603050405020304" pitchFamily="18" charset="0"/>
@@ -9994,10 +9757,6 @@
                 </a:rPr>
                 <a:t>B</a:t>
               </a:r>
-              <a:endParaRPr lang="en-GB" sz="2000" dirty="0">
-                <a:latin typeface="Times New Roman" panose="02020603050405020304" pitchFamily="18" charset="0"/>
-                <a:cs typeface="Times New Roman" panose="02020603050405020304" pitchFamily="18" charset="0"/>
-              </a:endParaRPr>
             </a:p>
           </p:txBody>
         </p:sp>
@@ -10124,15 +9883,7 @@
           <a:p>
             <a:r>
               <a:rPr lang="en-US" dirty="0"/>
-              <a:t>Example </a:t>
-            </a:r>
-            <a:r>
-              <a:rPr lang="en-US" dirty="0" smtClean="0"/>
-              <a:t>4 </a:t>
-            </a:r>
-            <a:r>
-              <a:rPr lang="en-US" dirty="0"/>
-              <a:t>- continue</a:t>
+              <a:t>Example 4 - continue</a:t>
             </a:r>
             <a:endParaRPr lang="en-SG" dirty="0"/>
           </a:p>
@@ -10178,12 +9929,8 @@
               <a:buNone/>
             </a:pPr>
             <a:r>
-              <a:rPr lang="en-US" sz="2000" dirty="0" smtClean="0"/>
-              <a:t>For </a:t>
-            </a:r>
-            <a:r>
               <a:rPr lang="en-US" sz="2000" dirty="0"/>
-              <a:t>mass A, using Newton’s second law</a:t>
+              <a:t>For mass A, using Newton’s second law</a:t>
             </a:r>
           </a:p>
           <a:p>
@@ -10207,7 +9954,7 @@
           <a:lstStyle/>
           <a:p>
             <a:r>
-              <a:rPr lang="en-US" smtClean="0"/>
+              <a:rPr lang="en-US"/>
               <a:t> Page </a:t>
             </a:r>
             <a:fld id="{D57F1E4F-1CFF-5643-939E-217C01CDF565}" type="slidenum">
@@ -10241,7 +9988,7 @@
           <a:graphicData uri="http://schemas.openxmlformats.org/presentationml/2006/ole">
             <mc:AlternateContent xmlns:mc="http://schemas.openxmlformats.org/markup-compatibility/2006">
               <mc:Choice xmlns:v="urn:schemas-microsoft-com:vml" Requires="v">
-                <p:oleObj spid="_x0000_s249912" name="Equation" r:id="rId3" imgW="1168200" imgH="1002960" progId="Equation.DSMT4">
+                <p:oleObj spid="_x0000_s249916" name="Equation" r:id="rId3" imgW="1168200" imgH="1002960" progId="Equation.DSMT4">
                   <p:embed/>
                 </p:oleObj>
               </mc:Choice>
@@ -10311,7 +10058,7 @@
           <a:graphicData uri="http://schemas.openxmlformats.org/presentationml/2006/ole">
             <mc:AlternateContent xmlns:mc="http://schemas.openxmlformats.org/markup-compatibility/2006">
               <mc:Choice xmlns:v="urn:schemas-microsoft-com:vml" Requires="v">
-                <p:oleObj spid="_x0000_s249913" name="Equation" r:id="rId5" imgW="1612800" imgH="1371600" progId="Equation.DSMT4">
+                <p:oleObj spid="_x0000_s249917" name="Equation" r:id="rId5" imgW="1612800" imgH="1371600" progId="Equation.DSMT4">
                   <p:embed/>
                 </p:oleObj>
               </mc:Choice>
@@ -10369,13 +10116,6 @@
   <p:clrMapOvr>
     <a:masterClrMapping/>
   </p:clrMapOvr>
-  <p:timing>
-    <p:tnLst>
-      <p:par>
-        <p:cTn id="1" dur="indefinite" restart="never" nodeType="tmRoot"/>
-      </p:par>
-    </p:tnLst>
-  </p:timing>
 </p:sld>
 </file>
 
@@ -10413,11 +10153,7 @@
           <a:p>
             <a:r>
               <a:rPr lang="en-GB" dirty="0"/>
-              <a:t>Example </a:t>
-            </a:r>
-            <a:r>
-              <a:rPr lang="en-GB" dirty="0" smtClean="0"/>
-              <a:t>5</a:t>
+              <a:t>Example 5</a:t>
             </a:r>
             <a:endParaRPr lang="en-SG" dirty="0"/>
           </a:p>
@@ -10449,15 +10185,7 @@
             </a:pPr>
             <a:r>
               <a:rPr lang="en-US" sz="2000" dirty="0"/>
-              <a:t>a) </a:t>
-            </a:r>
-            <a:r>
-              <a:rPr lang="en-US" sz="2000" dirty="0" smtClean="0"/>
-              <a:t>	A </a:t>
-            </a:r>
-            <a:r>
-              <a:rPr lang="en-US" sz="2000" dirty="0"/>
-              <a:t>gymnast with mass </a:t>
+              <a:t>a) 	A gymnast with mass </a:t>
             </a:r>
             <a:r>
               <a:rPr lang="en-US" sz="2000" dirty="0" err="1"/>
@@ -10487,11 +10215,11 @@
               </a:tabLst>
             </a:pPr>
             <a:r>
-              <a:rPr lang="en-GB" sz="2000" dirty="0" smtClean="0"/>
+              <a:rPr lang="en-GB" sz="2000" dirty="0"/>
               <a:t>	</a:t>
             </a:r>
             <a:r>
-              <a:rPr lang="en-GB" sz="2000" dirty="0" err="1" smtClean="0"/>
+              <a:rPr lang="en-GB" sz="2000" dirty="0" err="1"/>
               <a:t>i</a:t>
             </a:r>
             <a:r>
@@ -10511,12 +10239,8 @@
               </a:tabLst>
             </a:pPr>
             <a:r>
-              <a:rPr lang="en-GB" sz="2000" dirty="0" smtClean="0"/>
-              <a:t>	ii</a:t>
-            </a:r>
-            <a:r>
               <a:rPr lang="en-GB" sz="2000" dirty="0"/>
-              <a:t>) 	What force (magnitude and direction) does the rope exert on her?</a:t>
+              <a:t>	ii) 	What force (magnitude and direction) does the rope exert on her?</a:t>
             </a:r>
             <a:endParaRPr lang="en-US" sz="2000" dirty="0"/>
           </a:p>
@@ -10531,24 +10255,8 @@
               </a:tabLst>
             </a:pPr>
             <a:r>
-              <a:rPr lang="en-GB" sz="2000" dirty="0" smtClean="0"/>
-              <a:t>	iii</a:t>
-            </a:r>
-            <a:r>
               <a:rPr lang="en-GB" sz="2000" dirty="0"/>
-              <a:t>) </a:t>
-            </a:r>
-            <a:r>
-              <a:rPr lang="en-GB" sz="2000" dirty="0" smtClean="0"/>
-              <a:t>	What </a:t>
-            </a:r>
-            <a:r>
-              <a:rPr lang="en-GB" sz="2000" dirty="0"/>
-              <a:t>is the tension at the top of the rope</a:t>
-            </a:r>
-            <a:r>
-              <a:rPr lang="en-GB" sz="2000" dirty="0" smtClean="0"/>
-              <a:t>?</a:t>
+              <a:t>	iii) 	What is the tension at the top of the rope?</a:t>
             </a:r>
           </a:p>
           <a:p>
@@ -10559,12 +10267,8 @@
               <a:buNone/>
             </a:pPr>
             <a:r>
-              <a:rPr lang="en-GB" sz="2000" dirty="0" smtClean="0"/>
-              <a:t>b</a:t>
-            </a:r>
-            <a:r>
               <a:rPr lang="en-GB" sz="2000" dirty="0"/>
-              <a:t>) Find the tension at each end of the rope if the weight of the rope is 120 N. </a:t>
+              <a:t>b) Find the tension at each end of the rope if the weight of the rope is 120 N. </a:t>
             </a:r>
             <a:endParaRPr lang="en-US" sz="2000" dirty="0"/>
           </a:p>
@@ -10601,7 +10305,7 @@
           <a:lstStyle/>
           <a:p>
             <a:r>
-              <a:rPr lang="en-US" smtClean="0"/>
+              <a:rPr lang="en-US"/>
               <a:t> Page </a:t>
             </a:r>
             <a:fld id="{D57F1E4F-1CFF-5643-939E-217C01CDF565}" type="slidenum">
@@ -10761,11 +10465,7 @@
           <a:p>
             <a:r>
               <a:rPr lang="en-GB" dirty="0"/>
-              <a:t>Example </a:t>
-            </a:r>
-            <a:r>
-              <a:rPr lang="en-GB" dirty="0" smtClean="0"/>
-              <a:t>6</a:t>
+              <a:t>Example 6</a:t>
             </a:r>
             <a:endParaRPr lang="en-SG" dirty="0"/>
           </a:p>
@@ -10818,7 +10518,7 @@
           <a:lstStyle/>
           <a:p>
             <a:r>
-              <a:rPr lang="en-US" smtClean="0"/>
+              <a:rPr lang="en-US"/>
               <a:t> Page </a:t>
             </a:r>
             <a:fld id="{D57F1E4F-1CFF-5643-939E-217C01CDF565}" type="slidenum">
@@ -11003,10 +10703,9 @@
           <a:lstStyle/>
           <a:p>
             <a:r>
-              <a:rPr lang="en-SG" dirty="0" smtClean="0"/>
+              <a:rPr lang="en-SG" dirty="0"/>
               <a:t>Example 7</a:t>
             </a:r>
-            <a:endParaRPr lang="en-SG" dirty="0"/>
           </a:p>
         </p:txBody>
       </p:sp>
@@ -11029,12 +10728,8 @@
               <a:buNone/>
             </a:pPr>
             <a:r>
-              <a:rPr lang="en-US" sz="2000" dirty="0" smtClean="0"/>
-              <a:t>An </a:t>
-            </a:r>
-            <a:r>
               <a:rPr lang="en-US" sz="2000" dirty="0"/>
-              <a:t>air-track glider with mass m</a:t>
+              <a:t>An air-track glider with mass m</a:t>
             </a:r>
             <a:r>
               <a:rPr lang="en-US" sz="2000" baseline="-25000" dirty="0"/>
@@ -11078,7 +10773,7 @@
           <a:lstStyle/>
           <a:p>
             <a:r>
-              <a:rPr lang="en-US" smtClean="0"/>
+              <a:rPr lang="en-US"/>
               <a:t> Page </a:t>
             </a:r>
             <a:fld id="{D57F1E4F-1CFF-5643-939E-217C01CDF565}" type="slidenum">
@@ -11264,11 +10959,7 @@
           <a:p>
             <a:r>
               <a:rPr lang="en-GB" dirty="0"/>
-              <a:t>Example </a:t>
-            </a:r>
-            <a:r>
-              <a:rPr lang="en-GB" dirty="0" smtClean="0"/>
-              <a:t>8</a:t>
+              <a:t>Example 8</a:t>
             </a:r>
             <a:endParaRPr lang="en-SG" dirty="0"/>
           </a:p>
@@ -11294,15 +10985,7 @@
             </a:pPr>
             <a:r>
               <a:rPr lang="en-US" sz="2000" dirty="0"/>
-              <a:t>A </a:t>
-            </a:r>
-            <a:r>
-              <a:rPr lang="en-US" sz="2000" dirty="0" smtClean="0"/>
-              <a:t>granite </a:t>
-            </a:r>
-            <a:r>
-              <a:rPr lang="en-US" sz="2000" dirty="0"/>
-              <a:t>block on a cart with steel wheels (total weight of block and cart is w</a:t>
+              <a:t>A granite block on a cart with steel wheels (total weight of block and cart is w</a:t>
             </a:r>
             <a:r>
               <a:rPr lang="en-US" sz="2000" baseline="-25000" dirty="0"/>
@@ -11370,7 +11053,7 @@
           <a:lstStyle/>
           <a:p>
             <a:r>
-              <a:rPr lang="en-US" smtClean="0"/>
+              <a:rPr lang="en-US"/>
               <a:t> Page </a:t>
             </a:r>
             <a:fld id="{D57F1E4F-1CFF-5643-939E-217C01CDF565}" type="slidenum">
@@ -11556,11 +11239,7 @@
           <a:p>
             <a:r>
               <a:rPr lang="en-GB" dirty="0"/>
-              <a:t>Example </a:t>
-            </a:r>
-            <a:r>
-              <a:rPr lang="en-GB" dirty="0" smtClean="0"/>
-              <a:t>9</a:t>
+              <a:t>Example 9</a:t>
             </a:r>
             <a:endParaRPr lang="en-SG" dirty="0"/>
           </a:p>
@@ -11592,15 +11271,7 @@
             </a:pPr>
             <a:r>
               <a:rPr lang="en-US" sz="2000" dirty="0"/>
-              <a:t>(a) </a:t>
-            </a:r>
-            <a:r>
-              <a:rPr lang="en-US" sz="2000" dirty="0" smtClean="0"/>
-              <a:t>	An </a:t>
-            </a:r>
-            <a:r>
-              <a:rPr lang="en-US" sz="2000" dirty="0"/>
-              <a:t>elevator and its load have a combined mass of 800 kg. The elevator is initially moving downward at 10.0 m/s ; it slows to a stop with constant acceleration in a distance of 25.0 m. What is the tension T in the supporting cable while the elevator is being brought to rest?</a:t>
+              <a:t>(a) 	An elevator and its load have a combined mass of 800 kg. The elevator is initially moving downward at 10.0 m/s ; it slows to a stop with constant acceleration in a distance of 25.0 m. What is the tension T in the supporting cable while the elevator is being brought to rest?</a:t>
             </a:r>
           </a:p>
           <a:p>
@@ -11615,15 +11286,7 @@
             </a:pPr>
             <a:r>
               <a:rPr lang="en-GB" sz="2000" dirty="0"/>
-              <a:t>(b) </a:t>
-            </a:r>
-            <a:r>
-              <a:rPr lang="en-GB" sz="2000" dirty="0" smtClean="0"/>
-              <a:t>	If </a:t>
-            </a:r>
-            <a:r>
-              <a:rPr lang="en-GB" sz="2000" dirty="0"/>
-              <a:t>a 50.0 kg woman stands on a bathroom scale while riding in the elevator. What is the reading on the scale?</a:t>
+              <a:t>(b) 	If a 50.0 kg woman stands on a bathroom scale while riding in the elevator. What is the reading on the scale?</a:t>
             </a:r>
             <a:endParaRPr lang="en-US" sz="2000" dirty="0"/>
           </a:p>
@@ -11648,7 +11311,7 @@
           <a:lstStyle/>
           <a:p>
             <a:r>
-              <a:rPr lang="en-US" smtClean="0"/>
+              <a:rPr lang="en-US"/>
               <a:t> Page </a:t>
             </a:r>
             <a:fld id="{D57F1E4F-1CFF-5643-939E-217C01CDF565}" type="slidenum">
@@ -12174,7 +11837,7 @@
           <a:lstStyle/>
           <a:p>
             <a:r>
-              <a:rPr lang="en-US" smtClean="0"/>
+              <a:rPr lang="en-US"/>
               <a:t> Page </a:t>
             </a:r>
             <a:fld id="{D57F1E4F-1CFF-5643-939E-217C01CDF565}" type="slidenum">
@@ -12208,7 +11871,7 @@
           <a:graphicData uri="http://schemas.openxmlformats.org/presentationml/2006/ole">
             <mc:AlternateContent xmlns:mc="http://schemas.openxmlformats.org/markup-compatibility/2006">
               <mc:Choice xmlns:v="urn:schemas-microsoft-com:vml" Requires="v">
-                <p:oleObj spid="_x0000_s250903" name="Equation" r:id="rId3" imgW="1168200" imgH="380880" progId="Equation.DSMT4">
+                <p:oleObj spid="_x0000_s250905" name="Equation" r:id="rId3" imgW="1168200" imgH="380880" progId="Equation.DSMT4">
                   <p:embed/>
                 </p:oleObj>
               </mc:Choice>
@@ -12266,13 +11929,6 @@
   <p:clrMapOvr>
     <a:masterClrMapping/>
   </p:clrMapOvr>
-  <p:timing>
-    <p:tnLst>
-      <p:par>
-        <p:cTn id="1" dur="indefinite" restart="never" nodeType="tmRoot"/>
-      </p:par>
-    </p:tnLst>
-  </p:timing>
 </p:sld>
 </file>
 
@@ -12476,7 +12132,7 @@
           <a:lstStyle/>
           <a:p>
             <a:r>
-              <a:rPr lang="en-US" smtClean="0"/>
+              <a:rPr lang="en-US"/>
               <a:t> Page </a:t>
             </a:r>
             <a:fld id="{D57F1E4F-1CFF-5643-939E-217C01CDF565}" type="slidenum">
@@ -12510,7 +12166,7 @@
           <a:graphicData uri="http://schemas.openxmlformats.org/presentationml/2006/ole">
             <mc:AlternateContent xmlns:mc="http://schemas.openxmlformats.org/markup-compatibility/2006">
               <mc:Choice xmlns:v="urn:schemas-microsoft-com:vml" Requires="v">
-                <p:oleObj spid="_x0000_s251927" name="Equation" r:id="rId3" imgW="1612800" imgH="406080" progId="Equation.DSMT4">
+                <p:oleObj spid="_x0000_s251929" name="Equation" r:id="rId3" imgW="1612800" imgH="406080" progId="Equation.DSMT4">
                   <p:embed/>
                 </p:oleObj>
               </mc:Choice>
@@ -12568,13 +12224,6 @@
   <p:clrMapOvr>
     <a:masterClrMapping/>
   </p:clrMapOvr>
-  <p:timing>
-    <p:tnLst>
-      <p:par>
-        <p:cTn id="1" dur="indefinite" restart="never" nodeType="tmRoot"/>
-      </p:par>
-    </p:tnLst>
-  </p:timing>
 </p:sld>
 </file>
 
@@ -12612,11 +12261,7 @@
           <a:p>
             <a:r>
               <a:rPr lang="en-US" dirty="0"/>
-              <a:t>Friction </a:t>
-            </a:r>
-            <a:r>
-              <a:rPr lang="en-US" dirty="0" smtClean="0"/>
-              <a:t>forces</a:t>
+              <a:t>Friction forces</a:t>
             </a:r>
             <a:endParaRPr lang="en-SG" dirty="0"/>
           </a:p>
@@ -12667,7 +12312,7 @@
           <a:lstStyle/>
           <a:p>
             <a:r>
-              <a:rPr lang="en-US" smtClean="0"/>
+              <a:rPr lang="en-US"/>
               <a:t> Page </a:t>
             </a:r>
             <a:fld id="{D57F1E4F-1CFF-5643-939E-217C01CDF565}" type="slidenum">
@@ -12696,8 +12341,8 @@
         </p:blipFill>
         <p:spPr bwMode="auto">
           <a:xfrm>
-            <a:off x="2788828" y="1969576"/>
-            <a:ext cx="7337094" cy="4490209"/>
+            <a:off x="0" y="2322175"/>
+            <a:ext cx="12192000" cy="4523299"/>
           </a:xfrm>
           <a:prstGeom prst="rect">
             <a:avLst/>
@@ -12715,13 +12360,6 @@
   <p:clrMapOvr>
     <a:masterClrMapping/>
   </p:clrMapOvr>
-  <p:timing>
-    <p:tnLst>
-      <p:par>
-        <p:cTn id="1" dur="indefinite" restart="never" nodeType="tmRoot"/>
-      </p:par>
-    </p:tnLst>
-  </p:timing>
 </p:sld>
 </file>
 
@@ -12758,10 +12396,9 @@
           <a:lstStyle/>
           <a:p>
             <a:r>
-              <a:rPr lang="en-SG" dirty="0" smtClean="0"/>
+              <a:rPr lang="en-SG" dirty="0"/>
               <a:t>Force</a:t>
             </a:r>
-            <a:endParaRPr lang="en-SG" dirty="0"/>
           </a:p>
         </p:txBody>
       </p:sp>
@@ -12787,11 +12424,7 @@
             </a:pPr>
             <a:r>
               <a:rPr lang="en-US" dirty="0"/>
-              <a:t>A force </a:t>
-            </a:r>
-            <a:r>
-              <a:rPr lang="en-US" dirty="0" smtClean="0"/>
-              <a:t>is an </a:t>
+              <a:t>A force is an </a:t>
             </a:r>
             <a:r>
               <a:rPr lang="en-US" dirty="0">
@@ -12817,35 +12450,19 @@
               <a:rPr lang="en-US" dirty="0"/>
               <a:t> </a:t>
             </a:r>
-            <a:r>
-              <a:rPr lang="en-US" dirty="0" smtClean="0"/>
-              <a:t/>
-            </a:r>
             <a:br>
-              <a:rPr lang="en-US" dirty="0" smtClean="0"/>
+              <a:rPr lang="en-US" dirty="0"/>
             </a:br>
             <a:r>
-              <a:rPr lang="en-US" dirty="0" smtClean="0"/>
-              <a:t>bodies </a:t>
-            </a:r>
-            <a:r>
               <a:rPr lang="en-US" dirty="0"/>
-              <a:t>or between a body and its </a:t>
-            </a:r>
-            <a:r>
-              <a:rPr lang="en-US" dirty="0" smtClean="0"/>
-              <a:t/>
+              <a:t>bodies or between a body and its </a:t>
             </a:r>
             <a:br>
-              <a:rPr lang="en-US" dirty="0" smtClean="0"/>
+              <a:rPr lang="en-US" dirty="0"/>
             </a:br>
             <a:r>
-              <a:rPr lang="en-US" dirty="0" smtClean="0"/>
-              <a:t>environment</a:t>
-            </a:r>
-            <a:r>
               <a:rPr lang="en-US" dirty="0"/>
-              <a:t>.</a:t>
+              <a:t>environment.</a:t>
             </a:r>
           </a:p>
           <a:p>
@@ -12868,25 +12485,13 @@
             </a:r>
             <a:r>
               <a:rPr lang="en-GB" dirty="0"/>
-              <a:t> </a:t>
-            </a:r>
-            <a:r>
-              <a:rPr lang="en-GB" dirty="0" smtClean="0"/>
-              <a:t>force </a:t>
-            </a:r>
-            <a:r>
+              <a:t> force between </a:t>
+            </a:r>
+            <a:br>
               <a:rPr lang="en-GB" dirty="0"/>
-              <a:t>between </a:t>
-            </a:r>
-            <a:r>
-              <a:rPr lang="en-GB" dirty="0" smtClean="0"/>
-              <a:t/>
-            </a:r>
-            <a:br>
-              <a:rPr lang="en-GB" dirty="0" smtClean="0"/>
             </a:br>
             <a:r>
-              <a:rPr lang="en-GB" dirty="0" smtClean="0">
+              <a:rPr lang="en-GB" dirty="0">
                 <a:solidFill>
                   <a:srgbClr val="FF0000"/>
                 </a:solidFill>
@@ -12894,12 +12499,8 @@
               <a:t>two</a:t>
             </a:r>
             <a:r>
-              <a:rPr lang="en-GB" dirty="0" smtClean="0"/>
-              <a:t> </a:t>
-            </a:r>
-            <a:r>
               <a:rPr lang="en-GB" dirty="0"/>
-              <a:t>masses, </a:t>
+              <a:t> masses, </a:t>
             </a:r>
             <a:r>
               <a:rPr lang="en-GB" i="1" dirty="0"/>
@@ -12925,20 +12526,12 @@
               <a:rPr lang="en-GB" dirty="0"/>
               <a:t>, separated </a:t>
             </a:r>
-            <a:r>
-              <a:rPr lang="en-GB" dirty="0" smtClean="0"/>
-              <a:t/>
-            </a:r>
             <a:br>
-              <a:rPr lang="en-GB" dirty="0" smtClean="0"/>
+              <a:rPr lang="en-GB" dirty="0"/>
             </a:br>
             <a:r>
-              <a:rPr lang="en-GB" dirty="0" smtClean="0"/>
-              <a:t>by </a:t>
-            </a:r>
-            <a:r>
               <a:rPr lang="en-GB" dirty="0"/>
-              <a:t>distance </a:t>
+              <a:t>by distance </a:t>
             </a:r>
             <a:r>
               <a:rPr lang="en-GB" i="1" dirty="0"/>
@@ -12950,21 +12543,20 @@
             </a:r>
           </a:p>
           <a:p>
-            <a:endParaRPr lang="en-SG" dirty="0" smtClean="0"/>
-          </a:p>
-          <a:p>
-            <a:r>
-              <a:rPr lang="en-SG" dirty="0" smtClean="0"/>
+            <a:endParaRPr lang="en-SG" dirty="0"/>
+          </a:p>
+          <a:p>
+            <a:r>
+              <a:rPr lang="en-SG" dirty="0"/>
               <a:t>If either object disappears, the force</a:t>
             </a:r>
             <a:br>
-              <a:rPr lang="en-SG" dirty="0" smtClean="0"/>
+              <a:rPr lang="en-SG" dirty="0"/>
             </a:br>
             <a:r>
-              <a:rPr lang="en-SG" dirty="0" smtClean="0"/>
+              <a:rPr lang="en-SG" dirty="0"/>
               <a:t>between them also disappear.</a:t>
             </a:r>
-            <a:endParaRPr lang="en-SG" dirty="0"/>
           </a:p>
         </p:txBody>
       </p:sp>
@@ -12984,7 +12576,7 @@
           <a:lstStyle/>
           <a:p>
             <a:r>
-              <a:rPr lang="en-US" smtClean="0"/>
+              <a:rPr lang="en-US"/>
               <a:t> Page </a:t>
             </a:r>
             <a:fld id="{D57F1E4F-1CFF-5643-939E-217C01CDF565}" type="slidenum">
@@ -13018,7 +12610,7 @@
           <a:graphicData uri="http://schemas.openxmlformats.org/presentationml/2006/ole">
             <mc:AlternateContent xmlns:mc="http://schemas.openxmlformats.org/markup-compatibility/2006">
               <mc:Choice xmlns:v="urn:schemas-microsoft-com:vml" Requires="v">
-                <p:oleObj spid="_x0000_s240768" name="Equation" r:id="rId3" imgW="1828800" imgH="761760" progId="Equation.DSMT4">
+                <p:oleObj spid="_x0000_s240774" name="Equation" r:id="rId3" imgW="1828800" imgH="761760" progId="Equation.DSMT4">
                   <p:embed/>
                 </p:oleObj>
               </mc:Choice>
@@ -13275,10 +12867,6 @@
                   </a:rPr>
                   <a:t>r</a:t>
                 </a:r>
-                <a:endParaRPr lang="en-SG" sz="2000" i="1" dirty="0">
-                  <a:latin typeface="Times New Roman" panose="02020603050405020304" pitchFamily="18" charset="0"/>
-                  <a:cs typeface="Times New Roman" panose="02020603050405020304" pitchFamily="18" charset="0"/>
-                </a:endParaRPr>
               </a:p>
             </p:txBody>
           </p:sp>
@@ -13319,10 +12907,6 @@
                   </a:rPr>
                   <a:t>1</a:t>
                 </a:r>
-                <a:endParaRPr lang="en-SG" sz="2000" baseline="-25000" dirty="0">
-                  <a:latin typeface="Times New Roman" panose="02020603050405020304" pitchFamily="18" charset="0"/>
-                  <a:cs typeface="Times New Roman" panose="02020603050405020304" pitchFamily="18" charset="0"/>
-                </a:endParaRPr>
               </a:p>
             </p:txBody>
           </p:sp>
@@ -13363,10 +12947,6 @@
                   </a:rPr>
                   <a:t>2</a:t>
                 </a:r>
-                <a:endParaRPr lang="en-SG" sz="2000" baseline="-25000" dirty="0">
-                  <a:latin typeface="Times New Roman" panose="02020603050405020304" pitchFamily="18" charset="0"/>
-                  <a:cs typeface="Times New Roman" panose="02020603050405020304" pitchFamily="18" charset="0"/>
-                </a:endParaRPr>
               </a:p>
             </p:txBody>
           </p:sp>
@@ -13465,7 +13045,7 @@
             <a:graphicData uri="http://schemas.openxmlformats.org/presentationml/2006/ole">
               <mc:AlternateContent xmlns:mc="http://schemas.openxmlformats.org/markup-compatibility/2006">
                 <mc:Choice xmlns:v="urn:schemas-microsoft-com:vml" Requires="v">
-                  <p:oleObj spid="_x0000_s240769" name="Equation" r:id="rId5" imgW="609480" imgH="330120" progId="Equation.DSMT4">
+                  <p:oleObj spid="_x0000_s240775" name="Equation" r:id="rId5" imgW="609480" imgH="330120" progId="Equation.DSMT4">
                     <p:embed/>
                   </p:oleObj>
                 </mc:Choice>
@@ -13535,7 +13115,7 @@
             <a:graphicData uri="http://schemas.openxmlformats.org/presentationml/2006/ole">
               <mc:AlternateContent xmlns:mc="http://schemas.openxmlformats.org/markup-compatibility/2006">
                 <mc:Choice xmlns:v="urn:schemas-microsoft-com:vml" Requires="v">
-                  <p:oleObj spid="_x0000_s240770" name="Equation" r:id="rId7" imgW="609480" imgH="330120" progId="Equation.DSMT4">
+                  <p:oleObj spid="_x0000_s240776" name="Equation" r:id="rId7" imgW="609480" imgH="330120" progId="Equation.DSMT4">
                     <p:embed/>
                   </p:oleObj>
                 </mc:Choice>
@@ -13594,13 +13174,6 @@
   <p:clrMapOvr>
     <a:masterClrMapping/>
   </p:clrMapOvr>
-  <p:timing>
-    <p:tnLst>
-      <p:par>
-        <p:cTn id="1" dur="indefinite" restart="never" nodeType="tmRoot"/>
-      </p:par>
-    </p:tnLst>
-  </p:timing>
 </p:sld>
 </file>
 
@@ -13678,28 +13251,12 @@
               <a:buNone/>
             </a:pPr>
             <a:r>
-              <a:rPr lang="en-US" sz="2000" dirty="0" err="1" smtClean="0"/>
+              <a:rPr lang="en-US" sz="2000" dirty="0" err="1"/>
               <a:t>i</a:t>
             </a:r>
             <a:r>
               <a:rPr lang="en-US" sz="2000" dirty="0"/>
-              <a:t>)  </a:t>
-            </a:r>
-            <a:r>
-              <a:rPr lang="en-US" sz="2000" dirty="0" smtClean="0"/>
-              <a:t>	Assuming </a:t>
-            </a:r>
-            <a:r>
-              <a:rPr lang="en-US" sz="2000" dirty="0"/>
-              <a:t>no friction what is the acceleration of toboggan if the hill </a:t>
-            </a:r>
-            <a:r>
-              <a:rPr lang="en-US" sz="2000" dirty="0" smtClean="0"/>
-              <a:t>slopes </a:t>
-            </a:r>
-            <a:r>
-              <a:rPr lang="en-US" sz="2000" dirty="0"/>
-              <a:t>at a constant angle </a:t>
+              <a:t>)  	Assuming no friction what is the acceleration of toboggan if the hill slopes at a constant angle </a:t>
             </a:r>
             <a:r>
               <a:rPr lang="el-GR" sz="2000" dirty="0"/>
@@ -13718,20 +13275,8 @@
               <a:buNone/>
             </a:pPr>
             <a:r>
-              <a:rPr lang="en-GB" sz="2000" dirty="0" smtClean="0"/>
-              <a:t>ii</a:t>
-            </a:r>
-            <a:r>
               <a:rPr lang="en-GB" sz="2000" dirty="0"/>
-              <a:t>) </a:t>
-            </a:r>
-            <a:r>
-              <a:rPr lang="en-GB" sz="2000" dirty="0" smtClean="0"/>
-              <a:t>	Assuming </a:t>
-            </a:r>
-            <a:r>
-              <a:rPr lang="en-GB" sz="2000" dirty="0"/>
-              <a:t>friction with coefficient of kinetic friction µ</a:t>
+              <a:t>ii) 	Assuming friction with coefficient of kinetic friction µ</a:t>
             </a:r>
             <a:r>
               <a:rPr lang="en-GB" sz="2000" baseline="-25000" dirty="0"/>
@@ -13754,20 +13299,8 @@
               <a:buNone/>
             </a:pPr>
             <a:r>
-              <a:rPr lang="en-GB" sz="2000" dirty="0" smtClean="0"/>
-              <a:t>iii</a:t>
-            </a:r>
-            <a:r>
               <a:rPr lang="en-GB" sz="2000" dirty="0"/>
-              <a:t>) </a:t>
-            </a:r>
-            <a:r>
-              <a:rPr lang="en-GB" sz="2000" dirty="0" smtClean="0"/>
-              <a:t>	Assuming </a:t>
-            </a:r>
-            <a:r>
-              <a:rPr lang="en-GB" sz="2000" dirty="0"/>
-              <a:t>friction with coefficient of kinetic friction µ</a:t>
+              <a:t>iii) 	Assuming friction with coefficient of kinetic friction µ</a:t>
             </a:r>
             <a:r>
               <a:rPr lang="en-GB" sz="2000" baseline="-25000" dirty="0"/>
@@ -13823,7 +13356,7 @@
           <a:lstStyle/>
           <a:p>
             <a:r>
-              <a:rPr lang="en-US" smtClean="0"/>
+              <a:rPr lang="en-US"/>
               <a:t> Page </a:t>
             </a:r>
             <a:fld id="{D57F1E4F-1CFF-5643-939E-217C01CDF565}" type="slidenum">
@@ -14233,7 +13766,7 @@
           <a:lstStyle/>
           <a:p>
             <a:r>
-              <a:rPr lang="en-US" smtClean="0"/>
+              <a:rPr lang="en-US"/>
               <a:t> Page </a:t>
             </a:r>
             <a:fld id="{D57F1E4F-1CFF-5643-939E-217C01CDF565}" type="slidenum">
@@ -14279,13 +13812,6 @@
   <p:clrMapOvr>
     <a:masterClrMapping/>
   </p:clrMapOvr>
-  <p:timing>
-    <p:tnLst>
-      <p:par>
-        <p:cTn id="1" dur="indefinite" restart="never" nodeType="tmRoot"/>
-      </p:par>
-    </p:tnLst>
-  </p:timing>
 </p:sld>
 </file>
 
@@ -14465,7 +13991,7 @@
           <a:lstStyle/>
           <a:p>
             <a:r>
-              <a:rPr lang="en-US" smtClean="0"/>
+              <a:rPr lang="en-US"/>
               <a:t> Page </a:t>
             </a:r>
             <a:fld id="{D57F1E4F-1CFF-5643-939E-217C01CDF565}" type="slidenum">
@@ -14525,7 +14051,7 @@
           <a:graphicData uri="http://schemas.openxmlformats.org/presentationml/2006/ole">
             <mc:AlternateContent xmlns:mc="http://schemas.openxmlformats.org/markup-compatibility/2006">
               <mc:Choice xmlns:v="urn:schemas-microsoft-com:vml" Requires="v">
-                <p:oleObj spid="_x0000_s253002" name="Equation" r:id="rId4" imgW="253800" imgH="380880" progId="Equation.DSMT4">
+                <p:oleObj spid="_x0000_s253010" name="Equation" r:id="rId4" imgW="253800" imgH="380880" progId="Equation.DSMT4">
                   <p:embed/>
                 </p:oleObj>
               </mc:Choice>
@@ -14595,7 +14121,7 @@
           <a:graphicData uri="http://schemas.openxmlformats.org/presentationml/2006/ole">
             <mc:AlternateContent xmlns:mc="http://schemas.openxmlformats.org/markup-compatibility/2006">
               <mc:Choice xmlns:v="urn:schemas-microsoft-com:vml" Requires="v">
-                <p:oleObj spid="_x0000_s253003" name="Equation" r:id="rId6" imgW="279360" imgH="380880" progId="Equation.DSMT4">
+                <p:oleObj spid="_x0000_s253011" name="Equation" r:id="rId6" imgW="279360" imgH="380880" progId="Equation.DSMT4">
                   <p:embed/>
                 </p:oleObj>
               </mc:Choice>
@@ -14665,7 +14191,7 @@
           <a:graphicData uri="http://schemas.openxmlformats.org/presentationml/2006/ole">
             <mc:AlternateContent xmlns:mc="http://schemas.openxmlformats.org/markup-compatibility/2006">
               <mc:Choice xmlns:v="urn:schemas-microsoft-com:vml" Requires="v">
-                <p:oleObj spid="_x0000_s253004" name="Equation" r:id="rId8" imgW="1625400" imgH="431640" progId="Equation.DSMT4">
+                <p:oleObj spid="_x0000_s253012" name="Equation" r:id="rId8" imgW="1625400" imgH="431640" progId="Equation.DSMT4">
                   <p:embed/>
                 </p:oleObj>
               </mc:Choice>
@@ -14735,7 +14261,7 @@
           <a:graphicData uri="http://schemas.openxmlformats.org/presentationml/2006/ole">
             <mc:AlternateContent xmlns:mc="http://schemas.openxmlformats.org/markup-compatibility/2006">
               <mc:Choice xmlns:v="urn:schemas-microsoft-com:vml" Requires="v">
-                <p:oleObj spid="_x0000_s253005" name="Equation" r:id="rId10" imgW="1346040" imgH="1600200" progId="Equation.DSMT4">
+                <p:oleObj spid="_x0000_s253013" name="Equation" r:id="rId10" imgW="1346040" imgH="1600200" progId="Equation.DSMT4">
                   <p:embed/>
                 </p:oleObj>
               </mc:Choice>
@@ -14793,13 +14319,6 @@
   <p:clrMapOvr>
     <a:masterClrMapping/>
   </p:clrMapOvr>
-  <p:timing>
-    <p:tnLst>
-      <p:par>
-        <p:cTn id="1" dur="indefinite" restart="never" nodeType="tmRoot"/>
-      </p:par>
-    </p:tnLst>
-  </p:timing>
 </p:sld>
 </file>
 
@@ -14867,18 +14386,13 @@
               <a:rPr lang="en-US" dirty="0"/>
               <a:t>The magnitude of the average acceleration </a:t>
             </a:r>
-            <a:r>
-              <a:rPr lang="en-US" dirty="0" smtClean="0"/>
-              <a:t/>
-            </a:r>
             <a:br>
-              <a:rPr lang="en-US" dirty="0" smtClean="0"/>
+              <a:rPr lang="en-US" dirty="0"/>
             </a:br>
             <a:r>
-              <a:rPr lang="en-US" dirty="0" smtClean="0"/>
+              <a:rPr lang="en-US" dirty="0"/>
               <a:t>is</a:t>
             </a:r>
-            <a:endParaRPr lang="en-US" dirty="0"/>
           </a:p>
           <a:p>
             <a:pPr>
@@ -14895,27 +14409,15 @@
               </a:lnSpc>
             </a:pPr>
             <a:r>
-              <a:rPr lang="en-US" dirty="0" smtClean="0"/>
-              <a:t>The </a:t>
-            </a:r>
-            <a:r>
               <a:rPr lang="en-US" dirty="0"/>
-              <a:t>magnitude of the instantaneous </a:t>
-            </a:r>
-            <a:r>
-              <a:rPr lang="en-US" dirty="0" smtClean="0"/>
-              <a:t/>
+              <a:t>The magnitude of the instantaneous </a:t>
             </a:r>
             <a:br>
-              <a:rPr lang="en-US" dirty="0" smtClean="0"/>
+              <a:rPr lang="en-US" dirty="0"/>
             </a:br>
             <a:r>
-              <a:rPr lang="en-US" dirty="0" smtClean="0"/>
-              <a:t>acceleration </a:t>
-            </a:r>
-            <a:r>
               <a:rPr lang="en-US" dirty="0"/>
-              <a:t>is</a:t>
+              <a:t>acceleration is</a:t>
             </a:r>
           </a:p>
           <a:p>
@@ -14939,7 +14441,7 @@
           <a:lstStyle/>
           <a:p>
             <a:r>
-              <a:rPr lang="en-US" smtClean="0"/>
+              <a:rPr lang="en-US"/>
               <a:t> Page </a:t>
             </a:r>
             <a:fld id="{D57F1E4F-1CFF-5643-939E-217C01CDF565}" type="slidenum">
@@ -14973,7 +14475,7 @@
           <a:graphicData uri="http://schemas.openxmlformats.org/presentationml/2006/ole">
             <mc:AlternateContent xmlns:mc="http://schemas.openxmlformats.org/markup-compatibility/2006">
               <mc:Choice xmlns:v="urn:schemas-microsoft-com:vml" Requires="v">
-                <p:oleObj spid="_x0000_s253990" name="Equation" r:id="rId3" imgW="2082600" imgH="787320" progId="Equation.DSMT4">
+                <p:oleObj spid="_x0000_s253994" name="Equation" r:id="rId3" imgW="2082600" imgH="787320" progId="Equation.DSMT4">
                   <p:embed/>
                 </p:oleObj>
               </mc:Choice>
@@ -15043,7 +14545,7 @@
           <a:graphicData uri="http://schemas.openxmlformats.org/presentationml/2006/ole">
             <mc:AlternateContent xmlns:mc="http://schemas.openxmlformats.org/markup-compatibility/2006">
               <mc:Choice xmlns:v="urn:schemas-microsoft-com:vml" Requires="v">
-                <p:oleObj spid="_x0000_s253991" name="Equation" r:id="rId5" imgW="3060360" imgH="1625400" progId="Equation.DSMT4">
+                <p:oleObj spid="_x0000_s253995" name="Equation" r:id="rId5" imgW="3060360" imgH="1625400" progId="Equation.DSMT4">
                   <p:embed/>
                 </p:oleObj>
               </mc:Choice>
@@ -15127,13 +14629,6 @@
   <p:clrMapOvr>
     <a:masterClrMapping/>
   </p:clrMapOvr>
-  <p:timing>
-    <p:tnLst>
-      <p:par>
-        <p:cTn id="1" dur="indefinite" restart="never" nodeType="tmRoot"/>
-      </p:par>
-    </p:tnLst>
-  </p:timing>
 </p:sld>
 </file>
 
@@ -15227,12 +14722,8 @@
           </a:p>
           <a:p>
             <a:r>
-              <a:rPr lang="en-GB" dirty="0" smtClean="0"/>
-              <a:t>The </a:t>
-            </a:r>
-            <a:r>
               <a:rPr lang="en-GB" dirty="0"/>
-              <a:t>centripetal acceleration can be written in terms of </a:t>
+              <a:t>The centripetal acceleration can be written in terms of </a:t>
             </a:r>
             <a:r>
               <a:rPr lang="en-GB" i="1" dirty="0"/>
@@ -15264,7 +14755,7 @@
           <a:lstStyle/>
           <a:p>
             <a:r>
-              <a:rPr lang="en-US" smtClean="0"/>
+              <a:rPr lang="en-US"/>
               <a:t> Page </a:t>
             </a:r>
             <a:fld id="{D57F1E4F-1CFF-5643-939E-217C01CDF565}" type="slidenum">
@@ -15298,7 +14789,7 @@
           <a:graphicData uri="http://schemas.openxmlformats.org/presentationml/2006/ole">
             <mc:AlternateContent xmlns:mc="http://schemas.openxmlformats.org/markup-compatibility/2006">
               <mc:Choice xmlns:v="urn:schemas-microsoft-com:vml" Requires="v">
-                <p:oleObj spid="_x0000_s255012" name="Equation" r:id="rId3" imgW="1015920" imgH="723600" progId="Equation.DSMT4">
+                <p:oleObj spid="_x0000_s255016" name="Equation" r:id="rId3" imgW="1015920" imgH="723600" progId="Equation.DSMT4">
                   <p:embed/>
                 </p:oleObj>
               </mc:Choice>
@@ -15368,7 +14859,7 @@
           <a:graphicData uri="http://schemas.openxmlformats.org/presentationml/2006/ole">
             <mc:AlternateContent xmlns:mc="http://schemas.openxmlformats.org/markup-compatibility/2006">
               <mc:Choice xmlns:v="urn:schemas-microsoft-com:vml" Requires="v">
-                <p:oleObj spid="_x0000_s255013" name="Equation" r:id="rId5" imgW="1434960" imgH="850680" progId="Equation.DSMT4">
+                <p:oleObj spid="_x0000_s255017" name="Equation" r:id="rId5" imgW="1434960" imgH="850680" progId="Equation.DSMT4">
                   <p:embed/>
                 </p:oleObj>
               </mc:Choice>
@@ -15426,13 +14917,6 @@
   <p:clrMapOvr>
     <a:masterClrMapping/>
   </p:clrMapOvr>
-  <p:timing>
-    <p:tnLst>
-      <p:par>
-        <p:cTn id="1" dur="indefinite" restart="never" nodeType="tmRoot"/>
-      </p:par>
-    </p:tnLst>
-  </p:timing>
 </p:sld>
 </file>
 
@@ -15556,7 +15040,7 @@
           <a:lstStyle/>
           <a:p>
             <a:r>
-              <a:rPr lang="en-US" smtClean="0"/>
+              <a:rPr lang="en-US"/>
               <a:t> Page </a:t>
             </a:r>
             <a:fld id="{D57F1E4F-1CFF-5643-939E-217C01CDF565}" type="slidenum">
@@ -15604,13 +15088,6 @@
   <p:clrMapOvr>
     <a:masterClrMapping/>
   </p:clrMapOvr>
-  <p:timing>
-    <p:tnLst>
-      <p:par>
-        <p:cTn id="1" dur="indefinite" restart="never" nodeType="tmRoot"/>
-      </p:par>
-    </p:tnLst>
-  </p:timing>
 </p:sld>
 </file>
 
@@ -15734,7 +15211,6 @@
               <a:rPr lang="en-GB" sz="2400" dirty="0"/>
               <a:t>is perpendicular to the displacement of the particle and does no work on the particle. </a:t>
             </a:r>
-            <a:endParaRPr lang="en-GB" sz="2400" dirty="0"/>
           </a:p>
         </p:txBody>
       </p:sp>
@@ -15754,7 +15230,7 @@
           <a:lstStyle/>
           <a:p>
             <a:r>
-              <a:rPr lang="en-US" smtClean="0"/>
+              <a:rPr lang="en-US"/>
               <a:t> Page </a:t>
             </a:r>
             <a:fld id="{D57F1E4F-1CFF-5643-939E-217C01CDF565}" type="slidenum">
@@ -15776,13 +15252,6 @@
   <p:clrMapOvr>
     <a:masterClrMapping/>
   </p:clrMapOvr>
-  <p:timing>
-    <p:tnLst>
-      <p:par>
-        <p:cTn id="1" dur="indefinite" restart="never" nodeType="tmRoot"/>
-      </p:par>
-    </p:tnLst>
-  </p:timing>
 </p:sld>
 </file>
 
@@ -15951,7 +15420,6 @@
               <a:rPr lang="en-GB" sz="2000" dirty="0"/>
               <a:t>	ii)	What is providing this required force?</a:t>
             </a:r>
-            <a:endParaRPr lang="en-GB" sz="2000" dirty="0"/>
           </a:p>
         </p:txBody>
       </p:sp>
@@ -15971,7 +15439,7 @@
           <a:lstStyle/>
           <a:p>
             <a:r>
-              <a:rPr lang="en-US" smtClean="0"/>
+              <a:rPr lang="en-US"/>
               <a:t> Page </a:t>
             </a:r>
             <a:fld id="{D57F1E4F-1CFF-5643-939E-217C01CDF565}" type="slidenum">
@@ -15993,13 +15461,6 @@
   <p:clrMapOvr>
     <a:masterClrMapping/>
   </p:clrMapOvr>
-  <p:timing>
-    <p:tnLst>
-      <p:par>
-        <p:cTn id="1" dur="indefinite" restart="never" nodeType="tmRoot"/>
-      </p:par>
-    </p:tnLst>
-  </p:timing>
 </p:sld>
 </file>
 
@@ -16063,30 +15524,14 @@
             </a:pPr>
             <a:r>
               <a:rPr lang="en-GB" sz="2000" dirty="0"/>
-              <a:t>When an aircraft is moving in a horizontal plane at a constant speed of </a:t>
-            </a:r>
-            <a:r>
-              <a:rPr lang="en-GB" sz="2000" dirty="0" smtClean="0"/>
-              <a:t>650 </a:t>
-            </a:r>
-            <a:r>
+              <a:t>When an aircraft is moving in a horizontal plane at a constant speed of 650 m/s, its turning circle has a radius of 80 km. What is the ratio of the centripetal force to the weight of the aircraft? Take </a:t>
+            </a:r>
+            <a:br>
               <a:rPr lang="en-GB" sz="2000" dirty="0"/>
-              <a:t>m/s, its turning circle has a radius of 80 km. What is the ratio of the centripetal force to the weight of the aircraft? Take </a:t>
-            </a:r>
-            <a:r>
-              <a:rPr lang="en-GB" sz="2000" dirty="0" smtClean="0"/>
-              <a:t/>
-            </a:r>
-            <a:br>
-              <a:rPr lang="en-GB" sz="2000" dirty="0" smtClean="0"/>
             </a:br>
             <a:r>
-              <a:rPr lang="en-GB" sz="2000" dirty="0" smtClean="0"/>
-              <a:t>g </a:t>
-            </a:r>
-            <a:r>
               <a:rPr lang="en-GB" sz="2000" dirty="0"/>
-              <a:t>= 9.80 m/s</a:t>
+              <a:t>g = 9.80 m/s</a:t>
             </a:r>
             <a:r>
               <a:rPr lang="en-GB" sz="2000" baseline="30000" dirty="0"/>
@@ -16121,7 +15566,7 @@
           <a:lstStyle/>
           <a:p>
             <a:r>
-              <a:rPr lang="en-US" smtClean="0"/>
+              <a:rPr lang="en-US"/>
               <a:t> Page </a:t>
             </a:r>
             <a:fld id="{D57F1E4F-1CFF-5643-939E-217C01CDF565}" type="slidenum">
@@ -16155,7 +15600,7 @@
           <a:graphicData uri="http://schemas.openxmlformats.org/presentationml/2006/ole">
             <mc:AlternateContent xmlns:mc="http://schemas.openxmlformats.org/markup-compatibility/2006">
               <mc:Choice xmlns:v="urn:schemas-microsoft-com:vml" Requires="v">
-                <p:oleObj spid="_x0000_s256015" name="Equation" r:id="rId3" imgW="2387520" imgH="3288960" progId="Equation.DSMT4">
+                <p:oleObj spid="_x0000_s256017" name="Equation" r:id="rId3" imgW="2387520" imgH="3288960" progId="Equation.DSMT4">
                   <p:embed/>
                 </p:oleObj>
               </mc:Choice>
@@ -16391,7 +15836,7 @@
           <a:lstStyle/>
           <a:p>
             <a:r>
-              <a:rPr lang="en-US" smtClean="0"/>
+              <a:rPr lang="en-US"/>
               <a:t> Page </a:t>
             </a:r>
             <a:fld id="{D57F1E4F-1CFF-5643-939E-217C01CDF565}" type="slidenum">
@@ -16659,19 +16104,7 @@
             </a:pPr>
             <a:r>
               <a:rPr lang="en-GB" dirty="0"/>
-              <a:t>The gravitational force that </a:t>
-            </a:r>
-            <a:r>
-              <a:rPr lang="en-GB" dirty="0" smtClean="0"/>
-              <a:t>earth </a:t>
-            </a:r>
-            <a:r>
-              <a:rPr lang="en-GB" dirty="0"/>
-              <a:t>exerts on you is known as your weight     </a:t>
-            </a:r>
-            <a:r>
-              <a:rPr lang="en-GB" dirty="0" smtClean="0"/>
-              <a:t>.</a:t>
+              <a:t>The gravitational force that earth exerts on you is known as your weight     .</a:t>
             </a:r>
             <a:endParaRPr lang="en-US" dirty="0"/>
           </a:p>
@@ -16699,7 +16132,7 @@
           <a:lstStyle/>
           <a:p>
             <a:r>
-              <a:rPr lang="en-US" smtClean="0"/>
+              <a:rPr lang="en-US"/>
               <a:t> Page </a:t>
             </a:r>
             <a:fld id="{D57F1E4F-1CFF-5643-939E-217C01CDF565}" type="slidenum">
@@ -16733,7 +16166,7 @@
           <a:graphicData uri="http://schemas.openxmlformats.org/presentationml/2006/ole">
             <mc:AlternateContent xmlns:mc="http://schemas.openxmlformats.org/markup-compatibility/2006">
               <mc:Choice xmlns:v="urn:schemas-microsoft-com:vml" Requires="v">
-                <p:oleObj spid="_x0000_s241707" name="Equation" r:id="rId3" imgW="304560" imgH="368280" progId="Equation.DSMT4">
+                <p:oleObj spid="_x0000_s241709" name="Equation" r:id="rId3" imgW="304560" imgH="368280" progId="Equation.DSMT4">
                   <p:embed/>
                 </p:oleObj>
               </mc:Choice>
@@ -16783,13 +16216,6 @@
   <p:clrMapOvr>
     <a:masterClrMapping/>
   </p:clrMapOvr>
-  <p:timing>
-    <p:tnLst>
-      <p:par>
-        <p:cTn id="1" dur="indefinite" restart="never" nodeType="tmRoot"/>
-      </p:par>
-    </p:tnLst>
-  </p:timing>
 </p:sld>
 </file>
 
@@ -16826,7 +16252,7 @@
           <a:lstStyle/>
           <a:p>
             <a:r>
-              <a:rPr lang="en-GB" dirty="0" smtClean="0"/>
+              <a:rPr lang="en-GB" dirty="0"/>
               <a:t>Example 14</a:t>
             </a:r>
             <a:endParaRPr lang="en-SG" dirty="0"/>
@@ -16877,7 +16303,7 @@
           <a:lstStyle/>
           <a:p>
             <a:r>
-              <a:rPr lang="en-US" smtClean="0"/>
+              <a:rPr lang="en-US"/>
               <a:t> Page </a:t>
             </a:r>
             <a:fld id="{D57F1E4F-1CFF-5643-939E-217C01CDF565}" type="slidenum">
@@ -17067,51 +16493,23 @@
               <a:rPr lang="en-US" dirty="0"/>
               <a:t>If the speed of the particle on a circle </a:t>
             </a:r>
-            <a:r>
-              <a:rPr lang="en-US" dirty="0" smtClean="0"/>
-              <a:t/>
-            </a:r>
             <a:br>
-              <a:rPr lang="en-US" dirty="0" smtClean="0"/>
+              <a:rPr lang="en-US" dirty="0"/>
             </a:br>
             <a:r>
-              <a:rPr lang="en-US" dirty="0" smtClean="0"/>
-              <a:t>varies </a:t>
-            </a:r>
-            <a:r>
               <a:rPr lang="en-US" dirty="0"/>
-              <a:t>the </a:t>
-            </a:r>
-            <a:r>
-              <a:rPr lang="en-US" dirty="0" smtClean="0"/>
-              <a:t>motion, it </a:t>
-            </a:r>
-            <a:r>
+              <a:t>varies the motion, it is termed as </a:t>
+            </a:r>
+            <a:br>
               <a:rPr lang="en-US" dirty="0"/>
-              <a:t>is termed as </a:t>
-            </a:r>
-            <a:r>
-              <a:rPr lang="en-US" dirty="0" smtClean="0"/>
-              <a:t/>
-            </a:r>
-            <a:br>
-              <a:rPr lang="en-US" dirty="0" smtClean="0"/>
             </a:br>
-            <a:r>
-              <a:rPr lang="en-US" dirty="0" smtClean="0">
-                <a:solidFill>
-                  <a:srgbClr val="FF0000"/>
-                </a:solidFill>
-              </a:rPr>
-              <a:t>non-uniform </a:t>
-            </a:r>
             <a:r>
               <a:rPr lang="en-US" dirty="0">
                 <a:solidFill>
                   <a:srgbClr val="FF0000"/>
                 </a:solidFill>
               </a:rPr>
-              <a:t>circular </a:t>
+              <a:t>non-uniform circular </a:t>
             </a:r>
             <a:r>
               <a:rPr lang="en-US" dirty="0">
@@ -17132,43 +16530,27 @@
               <a:rPr lang="en-US" dirty="0"/>
               <a:t>In this motion, there will also be a </a:t>
             </a:r>
-            <a:r>
-              <a:rPr lang="en-US" dirty="0" smtClean="0"/>
-              <a:t/>
-            </a:r>
             <a:br>
-              <a:rPr lang="en-US" dirty="0" smtClean="0"/>
+              <a:rPr lang="en-US" dirty="0"/>
             </a:br>
             <a:r>
-              <a:rPr lang="en-US" dirty="0" smtClean="0"/>
-              <a:t>tangential </a:t>
-            </a:r>
-            <a:r>
               <a:rPr lang="en-US" dirty="0"/>
-              <a:t>acceleration component,  </a:t>
-            </a:r>
-            <a:r>
-              <a:rPr lang="en-US" dirty="0" smtClean="0"/>
-              <a:t/>
+              <a:t>tangential acceleration component,  </a:t>
             </a:r>
             <a:br>
-              <a:rPr lang="en-US" dirty="0" smtClean="0"/>
+              <a:rPr lang="en-US" dirty="0"/>
             </a:br>
             <a:r>
-              <a:rPr lang="en-US" i="1" dirty="0" err="1" smtClean="0"/>
+              <a:rPr lang="en-US" i="1" dirty="0" err="1"/>
               <a:t>a</a:t>
             </a:r>
             <a:r>
-              <a:rPr lang="en-US" baseline="-25000" dirty="0" err="1" smtClean="0"/>
+              <a:rPr lang="en-US" baseline="-25000" dirty="0" err="1"/>
               <a:t>tan</a:t>
             </a:r>
             <a:r>
-              <a:rPr lang="en-US" dirty="0" smtClean="0"/>
-              <a:t> </a:t>
-            </a:r>
-            <a:r>
               <a:rPr lang="en-US" dirty="0"/>
-              <a:t>that is </a:t>
+              <a:t> that is </a:t>
             </a:r>
             <a:r>
               <a:rPr lang="en-US" dirty="0">
@@ -17187,19 +16569,7 @@
             </a:br>
             <a:r>
               <a:rPr lang="en-US" dirty="0"/>
-              <a:t>instantaneous </a:t>
-            </a:r>
-            <a:r>
-              <a:rPr lang="en-US" dirty="0" smtClean="0"/>
-              <a:t>velocity</a:t>
-            </a:r>
-            <a:r>
-              <a:rPr lang="en-US" dirty="0"/>
-              <a:t> </a:t>
-            </a:r>
-            <a:r>
-              <a:rPr lang="en-US" dirty="0" smtClean="0"/>
-              <a:t>given by</a:t>
+              <a:t>instantaneous velocity given by</a:t>
             </a:r>
           </a:p>
           <a:p>
@@ -17240,7 +16610,7 @@
           <a:lstStyle/>
           <a:p>
             <a:r>
-              <a:rPr lang="en-US" smtClean="0"/>
+              <a:rPr lang="en-US"/>
               <a:t> Page </a:t>
             </a:r>
             <a:fld id="{D57F1E4F-1CFF-5643-939E-217C01CDF565}" type="slidenum">
@@ -17300,7 +16670,7 @@
           <a:graphicData uri="http://schemas.openxmlformats.org/presentationml/2006/ole">
             <mc:AlternateContent xmlns:mc="http://schemas.openxmlformats.org/markup-compatibility/2006">
               <mc:Choice xmlns:v="urn:schemas-microsoft-com:vml" Requires="v">
-                <p:oleObj spid="_x0000_s263184" name="Equation" r:id="rId4" imgW="1079280" imgH="723600" progId="Equation.DSMT4">
+                <p:oleObj spid="_x0000_s263188" name="Equation" r:id="rId4" imgW="1079280" imgH="723600" progId="Equation.DSMT4">
                   <p:embed/>
                 </p:oleObj>
               </mc:Choice>
@@ -17370,7 +16740,7 @@
           <a:graphicData uri="http://schemas.openxmlformats.org/presentationml/2006/ole">
             <mc:AlternateContent xmlns:mc="http://schemas.openxmlformats.org/markup-compatibility/2006">
               <mc:Choice xmlns:v="urn:schemas-microsoft-com:vml" Requires="v">
-                <p:oleObj spid="_x0000_s263185" name="Equation" r:id="rId6" imgW="1625400" imgH="380880" progId="Equation.DSMT4">
+                <p:oleObj spid="_x0000_s263189" name="Equation" r:id="rId6" imgW="1625400" imgH="380880" progId="Equation.DSMT4">
                   <p:embed/>
                 </p:oleObj>
               </mc:Choice>
@@ -17428,13 +16798,6 @@
   <p:clrMapOvr>
     <a:masterClrMapping/>
   </p:clrMapOvr>
-  <p:timing>
-    <p:tnLst>
-      <p:par>
-        <p:cTn id="1" dur="indefinite" restart="never" nodeType="tmRoot"/>
-      </p:par>
-    </p:tnLst>
-  </p:timing>
 </p:sld>
 </file>
 
@@ -17505,30 +16868,14 @@
             </a:r>
             <a:r>
               <a:rPr lang="en-GB" sz="2000" dirty="0"/>
-              <a:t> parallel to the roadway. The car passes over a rise in the roadway such that the top of the rise is shaped like a circle of radius 50.0 m. At the moment the car is at the top of the rise, its velocity vector is horizontal and has a magnitude </a:t>
-            </a:r>
-            <a:r>
-              <a:rPr lang="en-GB" sz="2000" dirty="0" smtClean="0"/>
-              <a:t>of</a:t>
+              <a:t> parallel to the roadway. The car passes over a rise in the roadway such that the top of the rise is shaped like a circle of radius 50.0 m. At the moment the car is at the top of the rise, its velocity vector is horizontal and has a magnitude of</a:t>
             </a:r>
             <a:br>
-              <a:rPr lang="en-GB" sz="2000" dirty="0" smtClean="0"/>
+              <a:rPr lang="en-GB" sz="2000" dirty="0"/>
             </a:br>
             <a:r>
-              <a:rPr lang="en-GB" sz="2000" dirty="0" smtClean="0"/>
-              <a:t>6.00 </a:t>
-            </a:r>
-            <a:r>
               <a:rPr lang="en-GB" sz="2000" dirty="0"/>
-              <a:t>m/s. What are the magnitude and direction of the total acceleration vector for the car at this </a:t>
-            </a:r>
-            <a:r>
-              <a:rPr lang="en-GB" sz="2000" dirty="0" smtClean="0"/>
-              <a:t>instant</a:t>
-            </a:r>
-            <a:r>
-              <a:rPr lang="en-GB" sz="2000" dirty="0"/>
-              <a:t>? </a:t>
+              <a:t>6.00 m/s. What are the magnitude and direction of the total acceleration vector for the car at this instant? </a:t>
             </a:r>
           </a:p>
           <a:p>
@@ -17552,7 +16899,7 @@
           <a:lstStyle/>
           <a:p>
             <a:r>
-              <a:rPr lang="en-US" smtClean="0"/>
+              <a:rPr lang="en-US"/>
               <a:t> Page </a:t>
             </a:r>
             <a:fld id="{D57F1E4F-1CFF-5643-939E-217C01CDF565}" type="slidenum">
@@ -17586,7 +16933,7 @@
           <a:graphicData uri="http://schemas.openxmlformats.org/presentationml/2006/ole">
             <mc:AlternateContent xmlns:mc="http://schemas.openxmlformats.org/markup-compatibility/2006">
               <mc:Choice xmlns:v="urn:schemas-microsoft-com:vml" Requires="v">
-                <p:oleObj spid="_x0000_s262155" name="Equation" r:id="rId3" imgW="3060360" imgH="3200400" progId="Equation.DSMT4">
+                <p:oleObj spid="_x0000_s262157" name="Equation" r:id="rId3" imgW="3060360" imgH="3200400" progId="Equation.DSMT4">
                   <p:embed/>
                 </p:oleObj>
               </mc:Choice>
@@ -18162,19 +17509,19 @@
             <a:pPr algn="ctr">
               <a:buNone/>
             </a:pPr>
-            <a:endParaRPr lang="en-GB" dirty="0" smtClean="0"/>
+            <a:endParaRPr lang="en-GB" dirty="0"/>
           </a:p>
           <a:p>
             <a:pPr algn="ctr">
               <a:buNone/>
             </a:pPr>
-            <a:endParaRPr lang="en-GB" dirty="0" smtClean="0"/>
+            <a:endParaRPr lang="en-GB" dirty="0"/>
           </a:p>
           <a:p>
             <a:pPr algn="ctr">
               <a:buNone/>
             </a:pPr>
-            <a:endParaRPr lang="en-GB" dirty="0" smtClean="0"/>
+            <a:endParaRPr lang="en-GB" dirty="0"/>
           </a:p>
           <a:p>
             <a:pPr algn="ctr">
@@ -18198,13 +17545,6 @@
   <p:clrMapOvr>
     <a:masterClrMapping/>
   </p:clrMapOvr>
-  <p:timing>
-    <p:tnLst>
-      <p:par>
-        <p:cTn id="1" dur="indefinite" restart="never" nodeType="tmRoot"/>
-      </p:par>
-    </p:tnLst>
-  </p:timing>
 </p:sld>
 </file>
 
@@ -18289,15 +17629,7 @@
             </a:r>
             <a:r>
               <a:rPr lang="en-GB" dirty="0"/>
-              <a:t> </a:t>
-            </a:r>
-            <a:r>
-              <a:rPr lang="en-GB" dirty="0" smtClean="0"/>
-              <a:t>depends </a:t>
-            </a:r>
-            <a:r>
-              <a:rPr lang="en-GB" dirty="0"/>
-              <a:t>directly on the velocity as</a:t>
+              <a:t> depends directly on the velocity as</a:t>
             </a:r>
           </a:p>
           <a:p>
@@ -18317,23 +17649,15 @@
             </a:pPr>
             <a:r>
               <a:rPr lang="en-GB" dirty="0"/>
-              <a:t>    </a:t>
-            </a:r>
-            <a:r>
-              <a:rPr lang="en-GB" dirty="0" smtClean="0"/>
-              <a:t>	where </a:t>
-            </a:r>
-            <a:r>
-              <a:rPr lang="en-GB" i="1" dirty="0" smtClean="0"/>
+              <a:t>    	where </a:t>
+            </a:r>
+            <a:r>
+              <a:rPr lang="en-GB" i="1" dirty="0"/>
               <a:t>k</a:t>
             </a:r>
             <a:r>
-              <a:rPr lang="en-GB" dirty="0" smtClean="0"/>
-              <a:t> </a:t>
-            </a:r>
-            <a:r>
               <a:rPr lang="en-GB" dirty="0"/>
-              <a:t>is a constant that depends on the shape and size of the body and properties of the fluid.</a:t>
+              <a:t> is a constant that depends on the shape and size of the body and properties of the fluid.</a:t>
             </a:r>
           </a:p>
           <a:p>
@@ -18369,7 +17693,7 @@
           <a:lstStyle/>
           <a:p>
             <a:r>
-              <a:rPr lang="en-US" smtClean="0"/>
+              <a:rPr lang="en-US"/>
               <a:t> Page </a:t>
             </a:r>
             <a:fld id="{D57F1E4F-1CFF-5643-939E-217C01CDF565}" type="slidenum">
@@ -18403,7 +17727,7 @@
           <a:graphicData uri="http://schemas.openxmlformats.org/presentationml/2006/ole">
             <mc:AlternateContent xmlns:mc="http://schemas.openxmlformats.org/markup-compatibility/2006">
               <mc:Choice xmlns:v="urn:schemas-microsoft-com:vml" Requires="v">
-                <p:oleObj spid="_x0000_s257037" name="Equation" r:id="rId3" imgW="812520" imgH="342720" progId="Equation.DSMT4">
+                <p:oleObj spid="_x0000_s257039" name="Equation" r:id="rId3" imgW="812520" imgH="342720" progId="Equation.DSMT4">
                   <p:embed/>
                 </p:oleObj>
               </mc:Choice>
@@ -18461,13 +17785,6 @@
   <p:clrMapOvr>
     <a:masterClrMapping/>
   </p:clrMapOvr>
-  <p:timing>
-    <p:tnLst>
-      <p:par>
-        <p:cTn id="1" dur="indefinite" restart="never" nodeType="tmRoot"/>
-      </p:par>
-    </p:tnLst>
-  </p:timing>
 </p:sld>
 </file>
 
@@ -18533,11 +17850,7 @@
             </a:pPr>
             <a:r>
               <a:rPr lang="en-GB" dirty="0"/>
-              <a:t>Consider a metal ball falling in oil such that the resistance force is            </a:t>
-            </a:r>
-            <a:r>
-              <a:rPr lang="en-GB" dirty="0" smtClean="0"/>
-              <a:t>. </a:t>
+              <a:t>Consider a metal ball falling in oil such that the resistance force is            . </a:t>
             </a:r>
           </a:p>
           <a:p>
@@ -18547,12 +17860,8 @@
               </a:lnSpc>
             </a:pPr>
             <a:r>
-              <a:rPr lang="en-GB" dirty="0" smtClean="0"/>
-              <a:t>According </a:t>
-            </a:r>
-            <a:r>
               <a:rPr lang="en-GB" dirty="0"/>
-              <a:t>to  Newton’s second law</a:t>
+              <a:t>According to  Newton’s second law</a:t>
             </a:r>
           </a:p>
           <a:p>
@@ -18562,12 +17871,8 @@
               </a:lnSpc>
             </a:pPr>
             <a:r>
-              <a:rPr lang="en-GB" dirty="0" smtClean="0"/>
-              <a:t>As </a:t>
-            </a:r>
-            <a:r>
               <a:rPr lang="en-GB" dirty="0"/>
-              <a:t>the ball falls, the speed will increase which will also increase the resistance force. </a:t>
+              <a:t>As the ball falls, the speed will increase which will also increase the resistance force. </a:t>
             </a:r>
           </a:p>
           <a:p>
@@ -18578,15 +17883,7 @@
             </a:pPr>
             <a:r>
               <a:rPr lang="en-GB" dirty="0"/>
-              <a:t>At a certain point of </a:t>
-            </a:r>
-            <a:r>
-              <a:rPr lang="en-GB" dirty="0" smtClean="0"/>
-              <a:t>time, </a:t>
-            </a:r>
-            <a:r>
-              <a:rPr lang="en-GB" dirty="0"/>
-              <a:t>the weight of the object will equal the resistance force.</a:t>
+              <a:t>At a certain point of time, the weight of the object will equal the resistance force.</a:t>
             </a:r>
           </a:p>
           <a:p>
@@ -18610,7 +17907,7 @@
           <a:lstStyle/>
           <a:p>
             <a:r>
-              <a:rPr lang="en-US" smtClean="0"/>
+              <a:rPr lang="en-US"/>
               <a:t> Page </a:t>
             </a:r>
             <a:fld id="{D57F1E4F-1CFF-5643-939E-217C01CDF565}" type="slidenum">
@@ -18644,7 +17941,7 @@
           <a:graphicData uri="http://schemas.openxmlformats.org/presentationml/2006/ole">
             <mc:AlternateContent xmlns:mc="http://schemas.openxmlformats.org/markup-compatibility/2006">
               <mc:Choice xmlns:v="urn:schemas-microsoft-com:vml" Requires="v">
-                <p:oleObj spid="_x0000_s259107" name="Equation" r:id="rId3" imgW="812520" imgH="342720" progId="Equation.DSMT4">
+                <p:oleObj spid="_x0000_s259113" name="Equation" r:id="rId3" imgW="812520" imgH="342720" progId="Equation.DSMT4">
                   <p:embed/>
                 </p:oleObj>
               </mc:Choice>
@@ -18714,7 +18011,7 @@
           <a:graphicData uri="http://schemas.openxmlformats.org/presentationml/2006/ole">
             <mc:AlternateContent xmlns:mc="http://schemas.openxmlformats.org/markup-compatibility/2006">
               <mc:Choice xmlns:v="urn:schemas-microsoft-com:vml" Requires="v">
-                <p:oleObj spid="_x0000_s259108" name="Equation" r:id="rId5" imgW="3060360" imgH="419040" progId="Equation.DSMT4">
+                <p:oleObj spid="_x0000_s259114" name="Equation" r:id="rId5" imgW="3060360" imgH="419040" progId="Equation.DSMT4">
                   <p:embed/>
                 </p:oleObj>
               </mc:Choice>
@@ -18784,7 +18081,7 @@
           <a:graphicData uri="http://schemas.openxmlformats.org/presentationml/2006/ole">
             <mc:AlternateContent xmlns:mc="http://schemas.openxmlformats.org/markup-compatibility/2006">
               <mc:Choice xmlns:v="urn:schemas-microsoft-com:vml" Requires="v">
-                <p:oleObj spid="_x0000_s259109" name="Equation" r:id="rId7" imgW="3416040" imgH="1218960" progId="Equation.DSMT4">
+                <p:oleObj spid="_x0000_s259115" name="Equation" r:id="rId7" imgW="3416040" imgH="1218960" progId="Equation.DSMT4">
                   <p:embed/>
                 </p:oleObj>
               </mc:Choice>
@@ -18842,13 +18139,6 @@
   <p:clrMapOvr>
     <a:masterClrMapping/>
   </p:clrMapOvr>
-  <p:timing>
-    <p:tnLst>
-      <p:par>
-        <p:cTn id="1" dur="indefinite" restart="never" nodeType="tmRoot"/>
-      </p:par>
-    </p:tnLst>
-  </p:timing>
 </p:sld>
 </file>
 
@@ -18886,11 +18176,7 @@
           <a:p>
             <a:r>
               <a:rPr lang="en-US" dirty="0"/>
-              <a:t>Terminal </a:t>
-            </a:r>
-            <a:r>
-              <a:rPr lang="en-US" dirty="0" smtClean="0"/>
-              <a:t>velocity – detailed calculation</a:t>
+              <a:t>Terminal velocity – detailed calculation</a:t>
             </a:r>
             <a:endParaRPr lang="en-SG" dirty="0"/>
           </a:p>
@@ -18920,14 +18206,6 @@
               <a:rPr lang="en-GB" dirty="0"/>
               <a:t>Consider a metal ball falling in oil such that the resistance force is            . </a:t>
             </a:r>
-          </a:p>
-          <a:p>
-            <a:pPr>
-              <a:lnSpc>
-                <a:spcPct val="110000"/>
-              </a:lnSpc>
-            </a:pPr>
-            <a:endParaRPr lang="en-GB" dirty="0" smtClean="0"/>
           </a:p>
           <a:p>
             <a:pPr>
@@ -18943,6 +18221,14 @@
                 <a:spcPct val="110000"/>
               </a:lnSpc>
             </a:pPr>
+            <a:endParaRPr lang="en-GB" dirty="0"/>
+          </a:p>
+          <a:p>
+            <a:pPr>
+              <a:lnSpc>
+                <a:spcPct val="110000"/>
+              </a:lnSpc>
+            </a:pPr>
             <a:r>
               <a:rPr lang="en-GB" dirty="0"/>
               <a:t>Solving the above equation with </a:t>
@@ -19004,7 +18290,7 @@
           <a:lstStyle/>
           <a:p>
             <a:r>
-              <a:rPr lang="en-US" smtClean="0"/>
+              <a:rPr lang="en-US"/>
               <a:t> Page </a:t>
             </a:r>
             <a:fld id="{D57F1E4F-1CFF-5643-939E-217C01CDF565}" type="slidenum">
@@ -19064,7 +18350,7 @@
           <a:graphicData uri="http://schemas.openxmlformats.org/presentationml/2006/ole">
             <mc:AlternateContent xmlns:mc="http://schemas.openxmlformats.org/markup-compatibility/2006">
               <mc:Choice xmlns:v="urn:schemas-microsoft-com:vml" Requires="v">
-                <p:oleObj spid="_x0000_s260128" name="Equation" r:id="rId4" imgW="3060360" imgH="1346040" progId="Equation.DSMT4">
+                <p:oleObj spid="_x0000_s260134" name="Equation" r:id="rId4" imgW="3060360" imgH="1346040" progId="Equation.DSMT4">
                   <p:embed/>
                 </p:oleObj>
               </mc:Choice>
@@ -19134,7 +18420,7 @@
           <a:graphicData uri="http://schemas.openxmlformats.org/presentationml/2006/ole">
             <mc:AlternateContent xmlns:mc="http://schemas.openxmlformats.org/markup-compatibility/2006">
               <mc:Choice xmlns:v="urn:schemas-microsoft-com:vml" Requires="v">
-                <p:oleObj spid="_x0000_s260129" name="Equation" r:id="rId6" imgW="8178480" imgH="825480" progId="Equation.DSMT4">
+                <p:oleObj spid="_x0000_s260135" name="Equation" r:id="rId6" imgW="8178480" imgH="825480" progId="Equation.DSMT4">
                   <p:embed/>
                 </p:oleObj>
               </mc:Choice>
@@ -19204,7 +18490,7 @@
           <a:graphicData uri="http://schemas.openxmlformats.org/presentationml/2006/ole">
             <mc:AlternateContent xmlns:mc="http://schemas.openxmlformats.org/markup-compatibility/2006">
               <mc:Choice xmlns:v="urn:schemas-microsoft-com:vml" Requires="v">
-                <p:oleObj spid="_x0000_s260130" name="Equation" r:id="rId8" imgW="838080" imgH="342720" progId="Equation.DSMT4">
+                <p:oleObj spid="_x0000_s260136" name="Equation" r:id="rId8" imgW="838080" imgH="342720" progId="Equation.DSMT4">
                   <p:embed/>
                 </p:oleObj>
               </mc:Choice>
@@ -19262,13 +18548,6 @@
   <p:clrMapOvr>
     <a:masterClrMapping/>
   </p:clrMapOvr>
-  <p:timing>
-    <p:tnLst>
-      <p:par>
-        <p:cTn id="1" dur="indefinite" restart="never" nodeType="tmRoot"/>
-      </p:par>
-    </p:tnLst>
-  </p:timing>
 </p:sld>
 </file>
 
@@ -19369,15 +18648,7 @@
             </a:r>
             <a:r>
               <a:rPr lang="en-GB" dirty="0"/>
-              <a:t>or simply drag</a:t>
-            </a:r>
-            <a:r>
-              <a:rPr lang="en-GB" dirty="0" smtClean="0"/>
-              <a:t>.</a:t>
-            </a:r>
-            <a:r>
-              <a:rPr lang="en-GB" dirty="0"/>
-              <a:t> Airplanes, falling rain drops and bicyclists all experience air drag. </a:t>
+              <a:t>or simply drag. Airplanes, falling rain drops and bicyclists all experience air drag. </a:t>
             </a:r>
           </a:p>
           <a:p>
@@ -19387,12 +18658,8 @@
               </a:lnSpc>
             </a:pPr>
             <a:r>
-              <a:rPr lang="en-GB" dirty="0" smtClean="0"/>
-              <a:t>Air </a:t>
-            </a:r>
-            <a:r>
               <a:rPr lang="en-GB" dirty="0"/>
-              <a:t>drag can be expressed as         </a:t>
+              <a:t>Air drag can be expressed as         </a:t>
             </a:r>
           </a:p>
           <a:p>
@@ -19406,7 +18673,6 @@
               <a:rPr lang="en-GB" dirty="0"/>
               <a:t>     where ‘D’ is a constant that depends on the shape and size of the body and the density of air. </a:t>
             </a:r>
-            <a:endParaRPr lang="en-GB" dirty="0" smtClean="0"/>
           </a:p>
           <a:p>
             <a:pPr>
@@ -19415,10 +18681,9 @@
               </a:lnSpc>
             </a:pPr>
             <a:r>
-              <a:rPr lang="en-GB" dirty="0" smtClean="0"/>
+              <a:rPr lang="en-GB" dirty="0"/>
               <a:t>The terminal velocity of objects under air drag is given by </a:t>
             </a:r>
-            <a:endParaRPr lang="en-GB" dirty="0"/>
           </a:p>
           <a:p>
             <a:endParaRPr lang="en-SG" dirty="0"/>
@@ -19441,7 +18706,7 @@
           <a:lstStyle/>
           <a:p>
             <a:r>
-              <a:rPr lang="en-US" smtClean="0"/>
+              <a:rPr lang="en-US"/>
               <a:t> Page </a:t>
             </a:r>
             <a:fld id="{D57F1E4F-1CFF-5643-939E-217C01CDF565}" type="slidenum">
@@ -19475,7 +18740,7 @@
           <a:graphicData uri="http://schemas.openxmlformats.org/presentationml/2006/ole">
             <mc:AlternateContent xmlns:mc="http://schemas.openxmlformats.org/markup-compatibility/2006">
               <mc:Choice xmlns:v="urn:schemas-microsoft-com:vml" Requires="v">
-                <p:oleObj spid="_x0000_s258067" name="Equation" r:id="rId3" imgW="1066680" imgH="457200" progId="Equation.DSMT4">
+                <p:oleObj spid="_x0000_s258071" name="Equation" r:id="rId3" imgW="1066680" imgH="457200" progId="Equation.DSMT4">
                   <p:embed/>
                 </p:oleObj>
               </mc:Choice>
@@ -19545,7 +18810,7 @@
           <a:graphicData uri="http://schemas.openxmlformats.org/presentationml/2006/ole">
             <mc:AlternateContent xmlns:mc="http://schemas.openxmlformats.org/markup-compatibility/2006">
               <mc:Choice xmlns:v="urn:schemas-microsoft-com:vml" Requires="v">
-                <p:oleObj spid="_x0000_s258068" name="Equation" r:id="rId5" imgW="1218960" imgH="799920" progId="Equation.DSMT4">
+                <p:oleObj spid="_x0000_s258072" name="Equation" r:id="rId5" imgW="1218960" imgH="799920" progId="Equation.DSMT4">
                   <p:embed/>
                 </p:oleObj>
               </mc:Choice>
@@ -19603,13 +18868,6 @@
   <p:clrMapOvr>
     <a:masterClrMapping/>
   </p:clrMapOvr>
-  <p:timing>
-    <p:tnLst>
-      <p:par>
-        <p:cTn id="1" dur="indefinite" restart="never" nodeType="tmRoot"/>
-      </p:par>
-    </p:tnLst>
-  </p:timing>
 </p:sld>
 </file>
 
@@ -19650,7 +18908,7 @@
           <a:bodyPr/>
           <a:lstStyle/>
           <a:p>
-            <a:endParaRPr lang="en-US" smtClean="0">
+            <a:endParaRPr lang="en-US">
               <a:latin typeface="Arial" charset="0"/>
             </a:endParaRPr>
           </a:p>
@@ -19676,7 +18934,7 @@
           <a:bodyPr/>
           <a:lstStyle/>
           <a:p>
-            <a:endParaRPr lang="en-US" smtClean="0"/>
+            <a:endParaRPr lang="en-US"/>
           </a:p>
         </p:txBody>
       </p:sp>
@@ -19741,7 +18999,7 @@
           <a:lstStyle/>
           <a:p>
             <a:r>
-              <a:rPr lang="en-US" smtClean="0"/>
+              <a:rPr lang="en-US"/>
               <a:t> Page </a:t>
             </a:r>
             <a:fld id="{D57F1E4F-1CFF-5643-939E-217C01CDF565}" type="slidenum">
@@ -19763,13 +19021,6 @@
   <p:clrMapOvr>
     <a:masterClrMapping/>
   </p:clrMapOvr>
-  <p:timing>
-    <p:tnLst>
-      <p:par>
-        <p:cTn id="1" dur="indefinite" restart="never" nodeType="tmRoot"/>
-      </p:par>
-    </p:tnLst>
-  </p:timing>
 </p:sld>
 </file>
 
@@ -19940,21 +19191,8 @@
                   <a:schemeClr val="tx1"/>
                 </a:solidFill>
               </a:rPr>
-              <a:t> </a:t>
-            </a:r>
-            <a:r>
-              <a:rPr lang="en-US" sz="2400" dirty="0" smtClean="0">
-                <a:solidFill>
-                  <a:schemeClr val="tx1"/>
-                </a:solidFill>
-              </a:rPr>
-              <a:t>force    . </a:t>
-            </a:r>
-            <a:endParaRPr lang="en-US" sz="2400" dirty="0">
-              <a:solidFill>
-                <a:schemeClr val="tx1"/>
-              </a:solidFill>
-            </a:endParaRPr>
+              <a:t> force    . </a:t>
+            </a:r>
           </a:p>
           <a:p>
             <a:pPr marL="365125" lvl="1" indent="-365125">
@@ -20021,23 +19259,7 @@
                   <a:schemeClr val="tx1"/>
                 </a:solidFill>
               </a:rPr>
-              <a:t> of </a:t>
-            </a:r>
-            <a:r>
-              <a:rPr lang="en-US" sz="2400" dirty="0" smtClean="0">
-                <a:solidFill>
-                  <a:schemeClr val="tx1"/>
-                </a:solidFill>
-              </a:rPr>
-              <a:t>the normal force </a:t>
-            </a:r>
-            <a:r>
-              <a:rPr lang="en-US" sz="2400" dirty="0">
-                <a:solidFill>
-                  <a:schemeClr val="tx1"/>
-                </a:solidFill>
-              </a:rPr>
-              <a:t>is not always </a:t>
+              <a:t> of the normal force is not always </a:t>
             </a:r>
             <a:r>
               <a:rPr lang="en-US" sz="2400" dirty="0">
@@ -20068,15 +19290,7 @@
                   <a:schemeClr val="tx1"/>
                 </a:solidFill>
               </a:rPr>
-              <a:t>of </a:t>
-            </a:r>
-            <a:r>
-              <a:rPr lang="en-US" sz="2400" dirty="0" smtClean="0">
-                <a:solidFill>
-                  <a:schemeClr val="tx1"/>
-                </a:solidFill>
-              </a:rPr>
-              <a:t>the weight of the object. </a:t>
+              <a:t>of the weight of the object. </a:t>
             </a:r>
           </a:p>
           <a:p>
@@ -20089,31 +19303,15 @@
               <a:buChar char=""/>
             </a:pPr>
             <a:r>
-              <a:rPr lang="en-US" sz="2400" dirty="0" smtClean="0">
-                <a:solidFill>
-                  <a:schemeClr val="tx1"/>
-                </a:solidFill>
-              </a:rPr>
-              <a:t>E.g</a:t>
-            </a:r>
-            <a:r>
               <a:rPr lang="en-US" sz="2400" dirty="0">
                 <a:solidFill>
                   <a:schemeClr val="tx1"/>
                 </a:solidFill>
               </a:rPr>
-              <a:t>. if the object is on an inclined surface, its normal reaction </a:t>
-            </a:r>
-            <a:r>
-              <a:rPr lang="en-US" sz="2400" dirty="0" smtClean="0">
-                <a:solidFill>
-                  <a:schemeClr val="tx1"/>
-                </a:solidFill>
-              </a:rPr>
-              <a:t>is </a:t>
-            </a:r>
-            <a:r>
-              <a:rPr lang="en-US" sz="2400" i="1" dirty="0" smtClean="0">
+              <a:t>E.g. if the object is on an inclined surface, its normal reaction is </a:t>
+            </a:r>
+            <a:r>
+              <a:rPr lang="en-US" sz="2400" i="1" dirty="0">
                 <a:solidFill>
                   <a:schemeClr val="tx1"/>
                 </a:solidFill>
@@ -20121,7 +19319,7 @@
               <a:t>N</a:t>
             </a:r>
             <a:r>
-              <a:rPr lang="en-US" sz="2400" dirty="0" smtClean="0">
+              <a:rPr lang="en-US" sz="2400" dirty="0">
                 <a:solidFill>
                   <a:schemeClr val="tx1"/>
                 </a:solidFill>
@@ -20184,7 +19382,7 @@
           <a:lstStyle/>
           <a:p>
             <a:r>
-              <a:rPr lang="en-US" smtClean="0"/>
+              <a:rPr lang="en-US"/>
               <a:t> Page </a:t>
             </a:r>
             <a:fld id="{D57F1E4F-1CFF-5643-939E-217C01CDF565}" type="slidenum">
@@ -20435,7 +19633,7 @@
             <a:graphicData uri="http://schemas.openxmlformats.org/presentationml/2006/ole">
               <mc:AlternateContent xmlns:mc="http://schemas.openxmlformats.org/markup-compatibility/2006">
                 <mc:Choice xmlns:v="urn:schemas-microsoft-com:vml" Requires="v">
-                  <p:oleObj spid="_x0000_s242885" name="Equation" r:id="rId3" imgW="253800" imgH="317160" progId="Equation.DSMT4">
+                  <p:oleObj spid="_x0000_s242895" name="Equation" r:id="rId3" imgW="253800" imgH="317160" progId="Equation.DSMT4">
                     <p:embed/>
                   </p:oleObj>
                 </mc:Choice>
@@ -20505,7 +19703,7 @@
             <a:graphicData uri="http://schemas.openxmlformats.org/presentationml/2006/ole">
               <mc:AlternateContent xmlns:mc="http://schemas.openxmlformats.org/markup-compatibility/2006">
                 <mc:Choice xmlns:v="urn:schemas-microsoft-com:vml" Requires="v">
-                  <p:oleObj spid="_x0000_s242886" name="Equation" r:id="rId5" imgW="266400" imgH="317160" progId="Equation.DSMT4">
+                  <p:oleObj spid="_x0000_s242896" name="Equation" r:id="rId5" imgW="266400" imgH="317160" progId="Equation.DSMT4">
                     <p:embed/>
                   </p:oleObj>
                 </mc:Choice>
@@ -20918,7 +20116,7 @@
             <a:graphicData uri="http://schemas.openxmlformats.org/presentationml/2006/ole">
               <mc:AlternateContent xmlns:mc="http://schemas.openxmlformats.org/markup-compatibility/2006">
                 <mc:Choice xmlns:v="urn:schemas-microsoft-com:vml" Requires="v">
-                  <p:oleObj spid="_x0000_s242887" name="Equation" r:id="rId7" imgW="266400" imgH="317160" progId="Equation.DSMT4">
+                  <p:oleObj spid="_x0000_s242897" name="Equation" r:id="rId7" imgW="266400" imgH="317160" progId="Equation.DSMT4">
                     <p:embed/>
                   </p:oleObj>
                 </mc:Choice>
@@ -20988,7 +20186,7 @@
             <a:graphicData uri="http://schemas.openxmlformats.org/presentationml/2006/ole">
               <mc:AlternateContent xmlns:mc="http://schemas.openxmlformats.org/markup-compatibility/2006">
                 <mc:Choice xmlns:v="urn:schemas-microsoft-com:vml" Requires="v">
-                  <p:oleObj spid="_x0000_s242888" name="Equation" r:id="rId9" imgW="253800" imgH="317160" progId="Equation.DSMT4">
+                  <p:oleObj spid="_x0000_s242898" name="Equation" r:id="rId9" imgW="253800" imgH="317160" progId="Equation.DSMT4">
                     <p:embed/>
                   </p:oleObj>
                 </mc:Choice>
@@ -21051,7 +20249,7 @@
           <a:graphicData uri="http://schemas.openxmlformats.org/presentationml/2006/ole">
             <mc:AlternateContent xmlns:mc="http://schemas.openxmlformats.org/markup-compatibility/2006">
               <mc:Choice xmlns:v="urn:schemas-microsoft-com:vml" Requires="v">
-                <p:oleObj spid="_x0000_s242889" name="Equation" r:id="rId11" imgW="291960" imgH="368280" progId="Equation.DSMT4">
+                <p:oleObj spid="_x0000_s242899" name="Equation" r:id="rId11" imgW="291960" imgH="368280" progId="Equation.DSMT4">
                   <p:embed/>
                 </p:oleObj>
               </mc:Choice>
@@ -21109,13 +20307,6 @@
   <p:clrMapOvr>
     <a:masterClrMapping/>
   </p:clrMapOvr>
-  <p:timing>
-    <p:tnLst>
-      <p:par>
-        <p:cTn id="1" dur="indefinite" restart="never" nodeType="tmRoot"/>
-      </p:par>
-    </p:tnLst>
-  </p:timing>
 </p:sld>
 </file>
 
@@ -21153,11 +20344,7 @@
           <a:p>
             <a:r>
               <a:rPr lang="en-US" dirty="0"/>
-              <a:t>Contact force – </a:t>
-            </a:r>
-            <a:r>
-              <a:rPr lang="en-US" dirty="0" smtClean="0"/>
-              <a:t>friction</a:t>
+              <a:t>Contact force – friction</a:t>
             </a:r>
             <a:endParaRPr lang="en-SG" dirty="0"/>
           </a:p>
@@ -21192,23 +20379,7 @@
                   <a:schemeClr val="tx1"/>
                 </a:solidFill>
               </a:rPr>
-              <a:t>Friction </a:t>
-            </a:r>
-            <a:r>
-              <a:rPr lang="en-US" sz="2400" dirty="0" smtClean="0">
-                <a:solidFill>
-                  <a:schemeClr val="tx1"/>
-                </a:solidFill>
-              </a:rPr>
-              <a:t>occurs </a:t>
-            </a:r>
-            <a:r>
-              <a:rPr lang="en-US" sz="2400" dirty="0">
-                <a:solidFill>
-                  <a:schemeClr val="tx1"/>
-                </a:solidFill>
-              </a:rPr>
-              <a:t>when a surface </a:t>
+              <a:t>Friction occurs when a surface </a:t>
             </a:r>
             <a:r>
               <a:rPr lang="en-US" sz="2400" dirty="0">
@@ -21242,15 +20413,15 @@
                   <a:schemeClr val="tx1"/>
                 </a:solidFill>
               </a:rPr>
-              <a:t>The direction of </a:t>
-            </a:r>
-            <a:r>
-              <a:rPr lang="en-US" sz="2400" dirty="0" smtClean="0">
+              <a:t>The direction of the frictional force is </a:t>
+            </a:r>
+            <a:r>
+              <a:rPr lang="en-US" sz="2400" dirty="0">
                 <a:solidFill>
-                  <a:schemeClr val="tx1"/>
+                  <a:srgbClr val="FF0000"/>
                 </a:solidFill>
               </a:rPr>
-              <a:t>the frictional </a:t>
+              <a:t>opposite</a:t>
             </a:r>
             <a:r>
               <a:rPr lang="en-US" sz="2400" dirty="0">
@@ -21258,39 +20429,7 @@
                   <a:schemeClr val="tx1"/>
                 </a:solidFill>
               </a:rPr>
-              <a:t>force is </a:t>
-            </a:r>
-            <a:r>
-              <a:rPr lang="en-US" sz="2400" dirty="0" smtClean="0">
-                <a:solidFill>
-                  <a:srgbClr val="FF0000"/>
-                </a:solidFill>
-              </a:rPr>
-              <a:t>opposite</a:t>
-            </a:r>
-            <a:r>
-              <a:rPr lang="en-US" sz="2400" dirty="0" smtClean="0">
-                <a:solidFill>
-                  <a:schemeClr val="tx1"/>
-                </a:solidFill>
-              </a:rPr>
-              <a:t> </a:t>
-            </a:r>
-            <a:r>
-              <a:rPr lang="en-US" sz="2400" dirty="0">
-                <a:solidFill>
-                  <a:schemeClr val="tx1"/>
-                </a:solidFill>
-              </a:rPr>
-              <a:t>to the direction of </a:t>
-            </a:r>
-            <a:r>
-              <a:rPr lang="en-US" sz="2400" dirty="0" smtClean="0">
-                <a:solidFill>
-                  <a:schemeClr val="tx1"/>
-                </a:solidFill>
-              </a:rPr>
-              <a:t>motion of the object. </a:t>
+              <a:t> to the direction of motion of the object. </a:t>
             </a:r>
             <a:endParaRPr lang="en-US" sz="2800" i="1" dirty="0"/>
           </a:p>
@@ -21315,7 +20454,7 @@
           <a:lstStyle/>
           <a:p>
             <a:r>
-              <a:rPr lang="en-US" smtClean="0"/>
+              <a:rPr lang="en-US"/>
               <a:t> Page </a:t>
             </a:r>
             <a:fld id="{D57F1E4F-1CFF-5643-939E-217C01CDF565}" type="slidenum">
@@ -21678,7 +20817,7 @@
             <a:graphicData uri="http://schemas.openxmlformats.org/presentationml/2006/ole">
               <mc:AlternateContent xmlns:mc="http://schemas.openxmlformats.org/markup-compatibility/2006">
                 <mc:Choice xmlns:v="urn:schemas-microsoft-com:vml" Requires="v">
-                  <p:oleObj spid="_x0000_s243828" name="Equation" r:id="rId3" imgW="253800" imgH="317160" progId="Equation.DSMT4">
+                  <p:oleObj spid="_x0000_s243834" name="Equation" r:id="rId3" imgW="253800" imgH="317160" progId="Equation.DSMT4">
                     <p:embed/>
                   </p:oleObj>
                 </mc:Choice>
@@ -21748,7 +20887,7 @@
             <a:graphicData uri="http://schemas.openxmlformats.org/presentationml/2006/ole">
               <mc:AlternateContent xmlns:mc="http://schemas.openxmlformats.org/markup-compatibility/2006">
                 <mc:Choice xmlns:v="urn:schemas-microsoft-com:vml" Requires="v">
-                  <p:oleObj spid="_x0000_s243829" name="Equation" r:id="rId5" imgW="266400" imgH="317160" progId="Equation.DSMT4">
+                  <p:oleObj spid="_x0000_s243835" name="Equation" r:id="rId5" imgW="266400" imgH="317160" progId="Equation.DSMT4">
                     <p:embed/>
                   </p:oleObj>
                 </mc:Choice>
@@ -21818,7 +20957,7 @@
             <a:graphicData uri="http://schemas.openxmlformats.org/presentationml/2006/ole">
               <mc:AlternateContent xmlns:mc="http://schemas.openxmlformats.org/markup-compatibility/2006">
                 <mc:Choice xmlns:v="urn:schemas-microsoft-com:vml" Requires="v">
-                  <p:oleObj spid="_x0000_s243830" name="Equation" r:id="rId7" imgW="215640" imgH="368280" progId="Equation.DSMT4">
+                  <p:oleObj spid="_x0000_s243836" name="Equation" r:id="rId7" imgW="215640" imgH="368280" progId="Equation.DSMT4">
                     <p:embed/>
                   </p:oleObj>
                 </mc:Choice>
@@ -21900,23 +21039,7 @@
                   <a:ea typeface="SimSun" pitchFamily="2" charset="-122"/>
                   <a:cs typeface="Times New Roman" panose="02020603050405020304" pitchFamily="18" charset="0"/>
                 </a:rPr>
-                <a:t>Direction of </a:t>
-              </a:r>
-              <a:r>
-                <a:rPr lang="en-GB" sz="2000" dirty="0" smtClean="0">
-                  <a:latin typeface="Times New Roman" panose="02020603050405020304" pitchFamily="18" charset="0"/>
-                  <a:ea typeface="SimSun" pitchFamily="2" charset="-122"/>
-                  <a:cs typeface="Times New Roman" panose="02020603050405020304" pitchFamily="18" charset="0"/>
-                </a:rPr>
-                <a:t>frictional </a:t>
-              </a:r>
-              <a:r>
-                <a:rPr lang="en-GB" sz="2000" dirty="0">
-                  <a:latin typeface="Times New Roman" panose="02020603050405020304" pitchFamily="18" charset="0"/>
-                  <a:ea typeface="SimSun" pitchFamily="2" charset="-122"/>
-                  <a:cs typeface="Times New Roman" panose="02020603050405020304" pitchFamily="18" charset="0"/>
-                </a:rPr>
-                <a:t>force</a:t>
+                <a:t>Direction of frictional force</a:t>
               </a:r>
               <a:endParaRPr lang="en-GB" sz="2000" dirty="0">
                 <a:latin typeface="Times New Roman" panose="02020603050405020304" pitchFamily="18" charset="0"/>
@@ -21936,13 +21059,6 @@
   <p:clrMapOvr>
     <a:masterClrMapping/>
   </p:clrMapOvr>
-  <p:timing>
-    <p:tnLst>
-      <p:par>
-        <p:cTn id="1" dur="indefinite" restart="never" nodeType="tmRoot"/>
-      </p:par>
-    </p:tnLst>
-  </p:timing>
 </p:sld>
 </file>
 
@@ -22193,7 +21309,7 @@
           <a:lstStyle/>
           <a:p>
             <a:r>
-              <a:rPr lang="en-US" smtClean="0"/>
+              <a:rPr lang="en-US"/>
               <a:t> Page </a:t>
             </a:r>
             <a:fld id="{D57F1E4F-1CFF-5643-939E-217C01CDF565}" type="slidenum">
@@ -22241,7 +21357,7 @@
             <a:graphicData uri="http://schemas.openxmlformats.org/presentationml/2006/ole">
               <mc:AlternateContent xmlns:mc="http://schemas.openxmlformats.org/markup-compatibility/2006">
                 <mc:Choice xmlns:v="urn:schemas-microsoft-com:vml" Requires="v">
-                  <p:oleObj spid="_x0000_s245042" name="Equation" r:id="rId3" imgW="266400" imgH="317160" progId="Equation.DSMT4">
+                  <p:oleObj spid="_x0000_s245058" name="Equation" r:id="rId3" imgW="266400" imgH="317160" progId="Equation.DSMT4">
                     <p:embed/>
                   </p:oleObj>
                 </mc:Choice>
@@ -22586,7 +21702,7 @@
             <a:graphicData uri="http://schemas.openxmlformats.org/presentationml/2006/ole">
               <mc:AlternateContent xmlns:mc="http://schemas.openxmlformats.org/markup-compatibility/2006">
                 <mc:Choice xmlns:v="urn:schemas-microsoft-com:vml" Requires="v">
-                  <p:oleObj spid="_x0000_s245043" name="Equation" r:id="rId5" imgW="253800" imgH="317160" progId="Equation.DSMT4">
+                  <p:oleObj spid="_x0000_s245059" name="Equation" r:id="rId5" imgW="253800" imgH="317160" progId="Equation.DSMT4">
                     <p:embed/>
                   </p:oleObj>
                 </mc:Choice>
@@ -22656,7 +21772,7 @@
             <a:graphicData uri="http://schemas.openxmlformats.org/presentationml/2006/ole">
               <mc:AlternateContent xmlns:mc="http://schemas.openxmlformats.org/markup-compatibility/2006">
                 <mc:Choice xmlns:v="urn:schemas-microsoft-com:vml" Requires="v">
-                  <p:oleObj spid="_x0000_s245044" name="Equation" r:id="rId7" imgW="203040" imgH="304560" progId="Equation.DSMT4">
+                  <p:oleObj spid="_x0000_s245060" name="Equation" r:id="rId7" imgW="203040" imgH="304560" progId="Equation.DSMT4">
                     <p:embed/>
                   </p:oleObj>
                 </mc:Choice>
@@ -22754,7 +21870,7 @@
             <a:graphicData uri="http://schemas.openxmlformats.org/presentationml/2006/ole">
               <mc:AlternateContent xmlns:mc="http://schemas.openxmlformats.org/markup-compatibility/2006">
                 <mc:Choice xmlns:v="urn:schemas-microsoft-com:vml" Requires="v">
-                  <p:oleObj spid="_x0000_s245045" name="Equation" r:id="rId9" imgW="203040" imgH="304560" progId="Equation.DSMT4">
+                  <p:oleObj spid="_x0000_s245061" name="Equation" r:id="rId9" imgW="203040" imgH="304560" progId="Equation.DSMT4">
                     <p:embed/>
                   </p:oleObj>
                 </mc:Choice>
@@ -22910,7 +22026,7 @@
             <a:graphicData uri="http://schemas.openxmlformats.org/presentationml/2006/ole">
               <mc:AlternateContent xmlns:mc="http://schemas.openxmlformats.org/markup-compatibility/2006">
                 <mc:Choice xmlns:v="urn:schemas-microsoft-com:vml" Requires="v">
-                  <p:oleObj spid="_x0000_s245046" name="Equation" r:id="rId11" imgW="266400" imgH="317160" progId="Equation.DSMT4">
+                  <p:oleObj spid="_x0000_s245062" name="Equation" r:id="rId11" imgW="266400" imgH="317160" progId="Equation.DSMT4">
                     <p:embed/>
                   </p:oleObj>
                 </mc:Choice>
@@ -23255,7 +22371,7 @@
             <a:graphicData uri="http://schemas.openxmlformats.org/presentationml/2006/ole">
               <mc:AlternateContent xmlns:mc="http://schemas.openxmlformats.org/markup-compatibility/2006">
                 <mc:Choice xmlns:v="urn:schemas-microsoft-com:vml" Requires="v">
-                  <p:oleObj spid="_x0000_s245047" name="Equation" r:id="rId12" imgW="253800" imgH="317160" progId="Equation.DSMT4">
+                  <p:oleObj spid="_x0000_s245063" name="Equation" r:id="rId12" imgW="253800" imgH="317160" progId="Equation.DSMT4">
                     <p:embed/>
                   </p:oleObj>
                 </mc:Choice>
@@ -23325,7 +22441,7 @@
             <a:graphicData uri="http://schemas.openxmlformats.org/presentationml/2006/ole">
               <mc:AlternateContent xmlns:mc="http://schemas.openxmlformats.org/markup-compatibility/2006">
                 <mc:Choice xmlns:v="urn:schemas-microsoft-com:vml" Requires="v">
-                  <p:oleObj spid="_x0000_s245048" name="Equation" r:id="rId13" imgW="215640" imgH="317160" progId="Equation.DSMT4">
+                  <p:oleObj spid="_x0000_s245064" name="Equation" r:id="rId13" imgW="215640" imgH="317160" progId="Equation.DSMT4">
                     <p:embed/>
                   </p:oleObj>
                 </mc:Choice>
@@ -23423,7 +22539,7 @@
             <a:graphicData uri="http://schemas.openxmlformats.org/presentationml/2006/ole">
               <mc:AlternateContent xmlns:mc="http://schemas.openxmlformats.org/markup-compatibility/2006">
                 <mc:Choice xmlns:v="urn:schemas-microsoft-com:vml" Requires="v">
-                  <p:oleObj spid="_x0000_s245049" name="Equation" r:id="rId15" imgW="215640" imgH="317160" progId="Equation.DSMT4">
+                  <p:oleObj spid="_x0000_s245065" name="Equation" r:id="rId15" imgW="215640" imgH="317160" progId="Equation.DSMT4">
                     <p:embed/>
                   </p:oleObj>
                 </mc:Choice>
@@ -23528,20 +22644,12 @@
             <a:lstStyle/>
             <a:p>
               <a:r>
-                <a:rPr lang="en-GB" sz="2000" dirty="0" smtClean="0">
-                  <a:latin typeface="Times New Roman" panose="02020603050405020304" pitchFamily="18" charset="0"/>
-                  <a:ea typeface="SimSun" pitchFamily="2" charset="-122"/>
-                  <a:cs typeface="Times New Roman" panose="02020603050405020304" pitchFamily="18" charset="0"/>
-                </a:rPr>
-                <a:t>Pushing </a:t>
-              </a:r>
-              <a:r>
                 <a:rPr lang="en-GB" sz="2000" dirty="0">
                   <a:latin typeface="Times New Roman" panose="02020603050405020304" pitchFamily="18" charset="0"/>
                   <a:ea typeface="SimSun" pitchFamily="2" charset="-122"/>
                   <a:cs typeface="Times New Roman" panose="02020603050405020304" pitchFamily="18" charset="0"/>
                 </a:rPr>
-                <a:t>force</a:t>
+                <a:t>Pushing force</a:t>
               </a:r>
               <a:endParaRPr lang="en-GB" sz="2000" dirty="0">
                 <a:latin typeface="Times New Roman" panose="02020603050405020304" pitchFamily="18" charset="0"/>
@@ -23561,13 +22669,6 @@
   <p:clrMapOvr>
     <a:masterClrMapping/>
   </p:clrMapOvr>
-  <p:timing>
-    <p:tnLst>
-      <p:par>
-        <p:cTn id="1" dur="indefinite" restart="never" nodeType="tmRoot"/>
-      </p:par>
-    </p:tnLst>
-  </p:timing>
 </p:sld>
 </file>
 
@@ -23781,7 +22882,7 @@
           <a:lstStyle/>
           <a:p>
             <a:r>
-              <a:rPr lang="en-US" smtClean="0"/>
+              <a:rPr lang="en-US"/>
               <a:t> Page </a:t>
             </a:r>
             <a:fld id="{D57F1E4F-1CFF-5643-939E-217C01CDF565}" type="slidenum">
@@ -23815,7 +22916,7 @@
           <a:graphicData uri="http://schemas.openxmlformats.org/presentationml/2006/ole">
             <mc:AlternateContent xmlns:mc="http://schemas.openxmlformats.org/markup-compatibility/2006">
               <mc:Choice xmlns:v="urn:schemas-microsoft-com:vml" Requires="v">
-                <p:oleObj spid="_x0000_s245836" name="Equation" r:id="rId3" imgW="3327120" imgH="431640" progId="Equation.DSMT4">
+                <p:oleObj spid="_x0000_s245840" name="Equation" r:id="rId3" imgW="3327120" imgH="431640" progId="Equation.DSMT4">
                   <p:embed/>
                 </p:oleObj>
               </mc:Choice>
@@ -23885,7 +22986,7 @@
           <a:graphicData uri="http://schemas.openxmlformats.org/presentationml/2006/ole">
             <mc:AlternateContent xmlns:mc="http://schemas.openxmlformats.org/markup-compatibility/2006">
               <mc:Choice xmlns:v="urn:schemas-microsoft-com:vml" Requires="v">
-                <p:oleObj spid="_x0000_s245837" name="Equation" r:id="rId5" imgW="4076640" imgH="419040" progId="Equation.DSMT4">
+                <p:oleObj spid="_x0000_s245841" name="Equation" r:id="rId5" imgW="4076640" imgH="419040" progId="Equation.DSMT4">
                   <p:embed/>
                 </p:oleObj>
               </mc:Choice>
@@ -23943,13 +23044,6 @@
   <p:clrMapOvr>
     <a:masterClrMapping/>
   </p:clrMapOvr>
-  <p:timing>
-    <p:tnLst>
-      <p:par>
-        <p:cTn id="1" dur="indefinite" restart="never" nodeType="tmRoot"/>
-      </p:par>
-    </p:tnLst>
-  </p:timing>
 </p:sld>
 </file>
 
@@ -24081,12 +23175,8 @@
               <a:t>do not </a:t>
             </a:r>
             <a:r>
-              <a:rPr lang="en-GB" dirty="0" smtClean="0"/>
-              <a:t>need </a:t>
-            </a:r>
-            <a:r>
               <a:rPr lang="en-GB" dirty="0"/>
-              <a:t>a force to sustain motion!</a:t>
+              <a:t>need a force to sustain motion!</a:t>
             </a:r>
           </a:p>
           <a:p>
@@ -24152,13 +23242,8 @@
             </a:r>
             <a:r>
               <a:rPr lang="en-US" dirty="0"/>
-              <a:t> its inertia</a:t>
-            </a:r>
-            <a:r>
-              <a:rPr lang="en-US" dirty="0" smtClean="0"/>
-              <a:t>.</a:t>
-            </a:r>
-            <a:endParaRPr lang="en-US" dirty="0"/>
+              <a:t> its inertia.</a:t>
+            </a:r>
           </a:p>
         </p:txBody>
       </p:sp>
@@ -24178,7 +23263,7 @@
           <a:lstStyle/>
           <a:p>
             <a:r>
-              <a:rPr lang="en-US" smtClean="0"/>
+              <a:rPr lang="en-US"/>
               <a:t> Page </a:t>
             </a:r>
             <a:fld id="{D57F1E4F-1CFF-5643-939E-217C01CDF565}" type="slidenum">
@@ -24200,13 +23285,6 @@
   <p:clrMapOvr>
     <a:masterClrMapping/>
   </p:clrMapOvr>
-  <p:timing>
-    <p:tnLst>
-      <p:par>
-        <p:cTn id="1" dur="indefinite" restart="never" nodeType="tmRoot"/>
-      </p:par>
-    </p:tnLst>
-  </p:timing>
 </p:sld>
 </file>
 

</xml_diff>